<commit_message>
Added intro and installer slides
</commit_message>
<xml_diff>
--- a/Nmapscanner_Presentation.pptx
+++ b/Nmapscanner_Presentation.pptx
@@ -6,13 +6,15 @@
   </p:sldMasterIdLst>
   <p:sldIdLst>
     <p:sldId id="256" r:id="rId2"/>
-    <p:sldId id="257" r:id="rId3"/>
-    <p:sldId id="258" r:id="rId4"/>
-    <p:sldId id="263" r:id="rId5"/>
-    <p:sldId id="260" r:id="rId6"/>
-    <p:sldId id="261" r:id="rId7"/>
-    <p:sldId id="259" r:id="rId8"/>
-    <p:sldId id="262" r:id="rId9"/>
+    <p:sldId id="265" r:id="rId3"/>
+    <p:sldId id="257" r:id="rId4"/>
+    <p:sldId id="258" r:id="rId5"/>
+    <p:sldId id="263" r:id="rId6"/>
+    <p:sldId id="264" r:id="rId7"/>
+    <p:sldId id="260" r:id="rId8"/>
+    <p:sldId id="261" r:id="rId9"/>
+    <p:sldId id="259" r:id="rId10"/>
+    <p:sldId id="262" r:id="rId11"/>
   </p:sldIdLst>
   <p:sldSz cx="12192000" cy="6858000"/>
   <p:notesSz cx="6858000" cy="9144000"/>
@@ -2225,8 +2227,8 @@
   </dgm:ptLst>
   <dgm:cxnLst>
     <dgm:cxn modelId="{3A6C1529-C98A-C34F-9D54-44BACD4C2DF1}" type="presOf" srcId="{28AA02AD-E2AC-4ABA-B1EF-9E0BFF254302}" destId="{56E01A08-CD30-E142-82E7-2150E8DA5D04}" srcOrd="0" destOrd="0" presId="urn:microsoft.com/office/officeart/2005/8/layout/vList5"/>
+    <dgm:cxn modelId="{FEA13F5A-F270-4610-9F5B-CC97009A405A}" srcId="{28AA02AD-E2AC-4ABA-B1EF-9E0BFF254302}" destId="{684125EE-8224-4550-8A5A-EE238D91EE49}" srcOrd="1" destOrd="0" parTransId="{99D0E43F-DA4C-49B7-BEA9-7DD3EB88A8F7}" sibTransId="{E855F73B-25F4-4D46-9D9C-D8AF1A5B8133}"/>
     <dgm:cxn modelId="{79FBC876-CD50-447B-B2D4-216D5CF9E096}" srcId="{28AA02AD-E2AC-4ABA-B1EF-9E0BFF254302}" destId="{87505DAE-B4F0-4A3A-86E8-38F5AE7A64BF}" srcOrd="2" destOrd="0" parTransId="{7CBC4E9A-C26D-4EA1-B52F-5B7EAE20E0B1}" sibTransId="{3F3E7B2E-B16B-48D2-931A-055B5E165625}"/>
-    <dgm:cxn modelId="{FEA13F5A-F270-4610-9F5B-CC97009A405A}" srcId="{28AA02AD-E2AC-4ABA-B1EF-9E0BFF254302}" destId="{684125EE-8224-4550-8A5A-EE238D91EE49}" srcOrd="1" destOrd="0" parTransId="{99D0E43F-DA4C-49B7-BEA9-7DD3EB88A8F7}" sibTransId="{E855F73B-25F4-4D46-9D9C-D8AF1A5B8133}"/>
     <dgm:cxn modelId="{278D8CA8-4523-EB40-8950-5618E8FB41B8}" type="presOf" srcId="{AC98E0FF-BB60-452F-ABCB-C1C7FD3C1F2F}" destId="{A539EF6D-8C5E-9549-9149-3411C206E187}" srcOrd="0" destOrd="0" presId="urn:microsoft.com/office/officeart/2005/8/layout/vList5"/>
     <dgm:cxn modelId="{DFBF16B2-8C72-E94C-914E-3527B734B27B}" type="presOf" srcId="{87505DAE-B4F0-4A3A-86E8-38F5AE7A64BF}" destId="{539A8CD8-181C-174F-BCA1-4BDBC6A4CB73}" srcOrd="0" destOrd="0" presId="urn:microsoft.com/office/officeart/2005/8/layout/vList5"/>
     <dgm:cxn modelId="{789DADF0-4243-1842-B50A-1430441343EC}" type="presOf" srcId="{684125EE-8224-4550-8A5A-EE238D91EE49}" destId="{F523DE71-DBC4-D844-9EE8-5AFB677E4338}" srcOrd="0" destOrd="0" presId="urn:microsoft.com/office/officeart/2005/8/layout/vList5"/>
@@ -5929,7 +5931,7 @@
           <a:p>
             <a:fld id="{FBBF67D9-30EE-4841-A430-DD7FE06690F4}" type="datetimeFigureOut">
               <a:rPr lang="en-US" smtClean="0"/>
-              <a:t>3/10/2024</a:t>
+              <a:t>3/10/24</a:t>
             </a:fld>
             <a:endParaRPr lang="en-US"/>
           </a:p>
@@ -6127,7 +6129,7 @@
           <a:p>
             <a:fld id="{FBBF67D9-30EE-4841-A430-DD7FE06690F4}" type="datetimeFigureOut">
               <a:rPr lang="en-US" smtClean="0"/>
-              <a:t>3/10/2024</a:t>
+              <a:t>3/10/24</a:t>
             </a:fld>
             <a:endParaRPr lang="en-US"/>
           </a:p>
@@ -6335,7 +6337,7 @@
           <a:p>
             <a:fld id="{FBBF67D9-30EE-4841-A430-DD7FE06690F4}" type="datetimeFigureOut">
               <a:rPr lang="en-US" smtClean="0"/>
-              <a:t>3/10/2024</a:t>
+              <a:t>3/10/24</a:t>
             </a:fld>
             <a:endParaRPr lang="en-US"/>
           </a:p>
@@ -6533,7 +6535,7 @@
           <a:p>
             <a:fld id="{FBBF67D9-30EE-4841-A430-DD7FE06690F4}" type="datetimeFigureOut">
               <a:rPr lang="en-US" smtClean="0"/>
-              <a:t>3/10/2024</a:t>
+              <a:t>3/10/24</a:t>
             </a:fld>
             <a:endParaRPr lang="en-US"/>
           </a:p>
@@ -6808,7 +6810,7 @@
           <a:p>
             <a:fld id="{FBBF67D9-30EE-4841-A430-DD7FE06690F4}" type="datetimeFigureOut">
               <a:rPr lang="en-US" smtClean="0"/>
-              <a:t>3/10/2024</a:t>
+              <a:t>3/10/24</a:t>
             </a:fld>
             <a:endParaRPr lang="en-US"/>
           </a:p>
@@ -7073,7 +7075,7 @@
           <a:p>
             <a:fld id="{FBBF67D9-30EE-4841-A430-DD7FE06690F4}" type="datetimeFigureOut">
               <a:rPr lang="en-US" smtClean="0"/>
-              <a:t>3/10/2024</a:t>
+              <a:t>3/10/24</a:t>
             </a:fld>
             <a:endParaRPr lang="en-US"/>
           </a:p>
@@ -7485,7 +7487,7 @@
           <a:p>
             <a:fld id="{FBBF67D9-30EE-4841-A430-DD7FE06690F4}" type="datetimeFigureOut">
               <a:rPr lang="en-US" smtClean="0"/>
-              <a:t>3/10/2024</a:t>
+              <a:t>3/10/24</a:t>
             </a:fld>
             <a:endParaRPr lang="en-US"/>
           </a:p>
@@ -7626,7 +7628,7 @@
           <a:p>
             <a:fld id="{FBBF67D9-30EE-4841-A430-DD7FE06690F4}" type="datetimeFigureOut">
               <a:rPr lang="en-US" smtClean="0"/>
-              <a:t>3/10/2024</a:t>
+              <a:t>3/10/24</a:t>
             </a:fld>
             <a:endParaRPr lang="en-US"/>
           </a:p>
@@ -7739,7 +7741,7 @@
           <a:p>
             <a:fld id="{FBBF67D9-30EE-4841-A430-DD7FE06690F4}" type="datetimeFigureOut">
               <a:rPr lang="en-US" smtClean="0"/>
-              <a:t>3/10/2024</a:t>
+              <a:t>3/10/24</a:t>
             </a:fld>
             <a:endParaRPr lang="en-US"/>
           </a:p>
@@ -8050,7 +8052,7 @@
           <a:p>
             <a:fld id="{FBBF67D9-30EE-4841-A430-DD7FE06690F4}" type="datetimeFigureOut">
               <a:rPr lang="en-US" smtClean="0"/>
-              <a:t>3/10/2024</a:t>
+              <a:t>3/10/24</a:t>
             </a:fld>
             <a:endParaRPr lang="en-US"/>
           </a:p>
@@ -8338,7 +8340,7 @@
           <a:p>
             <a:fld id="{FBBF67D9-30EE-4841-A430-DD7FE06690F4}" type="datetimeFigureOut">
               <a:rPr lang="en-US" smtClean="0"/>
-              <a:t>3/10/2024</a:t>
+              <a:t>3/10/24</a:t>
             </a:fld>
             <a:endParaRPr lang="en-US"/>
           </a:p>
@@ -8579,7 +8581,7 @@
           <a:p>
             <a:fld id="{FBBF67D9-30EE-4841-A430-DD7FE06690F4}" type="datetimeFigureOut">
               <a:rPr lang="en-US" smtClean="0"/>
-              <a:t>3/10/2024</a:t>
+              <a:t>3/10/24</a:t>
             </a:fld>
             <a:endParaRPr lang="en-US"/>
           </a:p>
@@ -9193,7 +9195,7 @@
         <p:spPr>
           <a:xfrm>
             <a:off x="477981" y="1122363"/>
-            <a:ext cx="4023360" cy="3204134"/>
+            <a:ext cx="4735150" cy="3204134"/>
           </a:xfrm>
         </p:spPr>
         <p:txBody>
@@ -9204,12 +9206,12 @@
           <a:p>
             <a:pPr algn="l"/>
             <a:r>
-              <a:rPr lang="en-US" sz="4800">
+              <a:rPr lang="en-US" sz="4800" dirty="0">
                 <a:solidFill>
                   <a:schemeClr val="bg1"/>
                 </a:solidFill>
               </a:rPr>
-              <a:t>Nmap Scanner</a:t>
+              <a:t>Network Scanner</a:t>
             </a:r>
           </a:p>
         </p:txBody>
@@ -9461,1479 +9463,7 @@
 </p:sld>
 </file>
 
-<file path=ppt/slides/slide2.xml><?xml version="1.0" encoding="utf-8"?>
-<p:sld xmlns:a="http://schemas.openxmlformats.org/drawingml/2006/main" xmlns:r="http://schemas.openxmlformats.org/officeDocument/2006/relationships" xmlns:p="http://schemas.openxmlformats.org/presentationml/2006/main">
-  <p:cSld>
-    <p:spTree>
-      <p:nvGrpSpPr>
-        <p:cNvPr id="1" name=""/>
-        <p:cNvGrpSpPr/>
-        <p:nvPr/>
-      </p:nvGrpSpPr>
-      <p:grpSpPr>
-        <a:xfrm>
-          <a:off x="0" y="0"/>
-          <a:ext cx="0" cy="0"/>
-          <a:chOff x="0" y="0"/>
-          <a:chExt cx="0" cy="0"/>
-        </a:xfrm>
-      </p:grpSpPr>
-      <p:sp>
-        <p:nvSpPr>
-          <p:cNvPr id="2" name="Title 1">
-            <a:extLst>
-              <a:ext uri="{FF2B5EF4-FFF2-40B4-BE49-F238E27FC236}">
-                <a16:creationId xmlns:a16="http://schemas.microsoft.com/office/drawing/2014/main" id="{3D1FDDDB-920A-1144-9B31-FB932661746F}"/>
-              </a:ext>
-            </a:extLst>
-          </p:cNvPr>
-          <p:cNvSpPr>
-            <a:spLocks noGrp="1"/>
-          </p:cNvSpPr>
-          <p:nvPr>
-            <p:ph type="title"/>
-          </p:nvPr>
-        </p:nvSpPr>
-        <p:spPr/>
-        <p:txBody>
-          <a:bodyPr/>
-          <a:lstStyle/>
-          <a:p>
-            <a:pPr algn="r"/>
-            <a:r>
-              <a:rPr lang="ar-SA"/>
-              <a:t>المهمة</a:t>
-            </a:r>
-            <a:endParaRPr lang="ar-SA" dirty="0"/>
-          </a:p>
-        </p:txBody>
-      </p:sp>
-      <p:graphicFrame>
-        <p:nvGraphicFramePr>
-          <p:cNvPr id="12" name="Content Placeholder 2">
-            <a:extLst>
-              <a:ext uri="{FF2B5EF4-FFF2-40B4-BE49-F238E27FC236}">
-                <a16:creationId xmlns:a16="http://schemas.microsoft.com/office/drawing/2014/main" id="{A4E8FD15-37C8-1D02-A2CF-528EE859F2E8}"/>
-              </a:ext>
-            </a:extLst>
-          </p:cNvPr>
-          <p:cNvGraphicFramePr>
-            <a:graphicFrameLocks noGrp="1"/>
-          </p:cNvGraphicFramePr>
-          <p:nvPr>
-            <p:ph idx="1"/>
-            <p:extLst>
-              <p:ext uri="{D42A27DB-BD31-4B8C-83A1-F6EECF244321}">
-                <p14:modId xmlns:p14="http://schemas.microsoft.com/office/powerpoint/2010/main" val="1447797471"/>
-              </p:ext>
-            </p:extLst>
-          </p:nvPr>
-        </p:nvGraphicFramePr>
-        <p:xfrm>
-          <a:off x="838200" y="1825625"/>
-          <a:ext cx="10515600" cy="4351338"/>
-        </p:xfrm>
-        <a:graphic>
-          <a:graphicData uri="http://schemas.openxmlformats.org/drawingml/2006/diagram">
-            <dgm:relIds xmlns:dgm="http://schemas.openxmlformats.org/drawingml/2006/diagram" xmlns:r="http://schemas.openxmlformats.org/officeDocument/2006/relationships" r:dm="rId2" r:lo="rId3" r:qs="rId4" r:cs="rId5"/>
-          </a:graphicData>
-        </a:graphic>
-      </p:graphicFrame>
-    </p:spTree>
-    <p:extLst>
-      <p:ext uri="{BB962C8B-B14F-4D97-AF65-F5344CB8AC3E}">
-        <p14:creationId xmlns:p14="http://schemas.microsoft.com/office/powerpoint/2010/main" val="4240163905"/>
-      </p:ext>
-    </p:extLst>
-  </p:cSld>
-  <p:clrMapOvr>
-    <a:masterClrMapping/>
-  </p:clrMapOvr>
-</p:sld>
-</file>
-
-<file path=ppt/slides/slide3.xml><?xml version="1.0" encoding="utf-8"?>
-<p:sld xmlns:a="http://schemas.openxmlformats.org/drawingml/2006/main" xmlns:r="http://schemas.openxmlformats.org/officeDocument/2006/relationships" xmlns:p="http://schemas.openxmlformats.org/presentationml/2006/main">
-  <p:cSld>
-    <p:bg>
-      <p:bgPr>
-        <a:solidFill>
-          <a:schemeClr val="bg1"/>
-        </a:solidFill>
-        <a:effectLst/>
-      </p:bgPr>
-    </p:bg>
-    <p:spTree>
-      <p:nvGrpSpPr>
-        <p:cNvPr id="1" name=""/>
-        <p:cNvGrpSpPr/>
-        <p:nvPr/>
-      </p:nvGrpSpPr>
-      <p:grpSpPr>
-        <a:xfrm>
-          <a:off x="0" y="0"/>
-          <a:ext cx="0" cy="0"/>
-          <a:chOff x="0" y="0"/>
-          <a:chExt cx="0" cy="0"/>
-        </a:xfrm>
-      </p:grpSpPr>
-      <p:sp useBgFill="1">
-        <p:nvSpPr>
-          <p:cNvPr id="8" name="Rectangle 7">
-            <a:extLst>
-              <a:ext uri="{FF2B5EF4-FFF2-40B4-BE49-F238E27FC236}">
-                <a16:creationId xmlns:a16="http://schemas.microsoft.com/office/drawing/2014/main" id="{1B15ED52-F352-441B-82BF-E0EA34836D08}"/>
-              </a:ext>
-              <a:ext uri="{C183D7F6-B498-43B3-948B-1728B52AA6E4}">
-                <adec:decorative xmlns:adec="http://schemas.microsoft.com/office/drawing/2017/decorative" val="1"/>
-              </a:ext>
-            </a:extLst>
-          </p:cNvPr>
-          <p:cNvSpPr>
-            <a:spLocks noGrp="1" noRot="1" noChangeAspect="1" noMove="1" noResize="1" noEditPoints="1" noAdjustHandles="1" noChangeArrowheads="1" noChangeShapeType="1" noTextEdit="1"/>
-          </p:cNvSpPr>
-          <p:nvPr>
-            <p:extLst>
-              <p:ext uri="{386F3935-93C4-4BCD-93E2-E3B085C9AB24}">
-                <p16:designElem xmlns:p16="http://schemas.microsoft.com/office/powerpoint/2015/main" val="1"/>
-              </p:ext>
-            </p:extLst>
-          </p:nvPr>
-        </p:nvSpPr>
-        <p:spPr>
-          <a:xfrm>
-            <a:off x="0" y="0"/>
-            <a:ext cx="12192000" cy="6858000"/>
-          </a:xfrm>
-          <a:prstGeom prst="rect">
-            <a:avLst/>
-          </a:prstGeom>
-          <a:ln w="12700" cap="flat" cmpd="sng" algn="ctr">
-            <a:noFill/>
-            <a:prstDash val="solid"/>
-            <a:miter lim="800000"/>
-          </a:ln>
-          <a:effectLst/>
-          <a:extLst>
-            <a:ext uri="{91240B29-F687-4F45-9708-019B960494DF}">
-              <a14:hiddenLine xmlns:a14="http://schemas.microsoft.com/office/drawing/2010/main" w="12700" cap="flat" cmpd="sng" algn="ctr">
-                <a:solidFill>
-                  <a:schemeClr val="accent1">
-                    <a:shade val="50000"/>
-                  </a:schemeClr>
-                </a:solidFill>
-                <a:prstDash val="solid"/>
-                <a:miter lim="800000"/>
-              </a14:hiddenLine>
-            </a:ext>
-          </a:extLst>
-        </p:spPr>
-        <p:style>
-          <a:lnRef idx="2">
-            <a:schemeClr val="accent1">
-              <a:shade val="50000"/>
-            </a:schemeClr>
-          </a:lnRef>
-          <a:fillRef idx="1">
-            <a:schemeClr val="accent1"/>
-          </a:fillRef>
-          <a:effectRef idx="0">
-            <a:schemeClr val="accent1"/>
-          </a:effectRef>
-          <a:fontRef idx="minor">
-            <a:schemeClr val="lt1"/>
-          </a:fontRef>
-        </p:style>
-        <p:txBody>
-          <a:bodyPr rtlCol="0" anchor="ctr"/>
-          <a:lstStyle/>
-          <a:p>
-            <a:pPr algn="ctr"/>
-            <a:endParaRPr lang="en-US"/>
-          </a:p>
-        </p:txBody>
-      </p:sp>
-      <p:sp>
-        <p:nvSpPr>
-          <p:cNvPr id="10" name="Rectangle 9">
-            <a:extLst>
-              <a:ext uri="{FF2B5EF4-FFF2-40B4-BE49-F238E27FC236}">
-                <a16:creationId xmlns:a16="http://schemas.microsoft.com/office/drawing/2014/main" id="{3B2E3793-BFE6-45A2-9B7B-E18844431C99}"/>
-              </a:ext>
-              <a:ext uri="{C183D7F6-B498-43B3-948B-1728B52AA6E4}">
-                <adec:decorative xmlns:adec="http://schemas.microsoft.com/office/drawing/2017/decorative" val="1"/>
-              </a:ext>
-            </a:extLst>
-          </p:cNvPr>
-          <p:cNvSpPr>
-            <a:spLocks noGrp="1" noRot="1" noChangeAspect="1" noMove="1" noResize="1" noEditPoints="1" noAdjustHandles="1" noChangeArrowheads="1" noChangeShapeType="1" noTextEdit="1"/>
-          </p:cNvSpPr>
-          <p:nvPr>
-            <p:extLst>
-              <p:ext uri="{386F3935-93C4-4BCD-93E2-E3B085C9AB24}">
-                <p16:designElem xmlns:p16="http://schemas.microsoft.com/office/powerpoint/2015/main" val="1"/>
-              </p:ext>
-            </p:extLst>
-          </p:nvPr>
-        </p:nvSpPr>
-        <p:spPr>
-          <a:xfrm flipH="1">
-            <a:off x="-1" y="-1"/>
-            <a:ext cx="12191998" cy="1590742"/>
-          </a:xfrm>
-          <a:prstGeom prst="rect">
-            <a:avLst/>
-          </a:prstGeom>
-          <a:gradFill>
-            <a:gsLst>
-              <a:gs pos="0">
-                <a:srgbClr val="000000"/>
-              </a:gs>
-              <a:gs pos="100000">
-                <a:schemeClr val="accent1">
-                  <a:lumMod val="75000"/>
-                </a:schemeClr>
-              </a:gs>
-            </a:gsLst>
-            <a:lin ang="8400000" scaled="0"/>
-          </a:gradFill>
-          <a:ln>
-            <a:noFill/>
-          </a:ln>
-        </p:spPr>
-        <p:style>
-          <a:lnRef idx="2">
-            <a:schemeClr val="accent1">
-              <a:shade val="50000"/>
-            </a:schemeClr>
-          </a:lnRef>
-          <a:fillRef idx="1">
-            <a:schemeClr val="accent1"/>
-          </a:fillRef>
-          <a:effectRef idx="0">
-            <a:schemeClr val="accent1"/>
-          </a:effectRef>
-          <a:fontRef idx="minor">
-            <a:schemeClr val="lt1"/>
-          </a:fontRef>
-        </p:style>
-        <p:txBody>
-          <a:bodyPr rtlCol="0" anchor="ctr"/>
-          <a:lstStyle/>
-          <a:p>
-            <a:pPr algn="ctr"/>
-            <a:endParaRPr lang="en-US"/>
-          </a:p>
-        </p:txBody>
-      </p:sp>
-      <p:sp>
-        <p:nvSpPr>
-          <p:cNvPr id="12" name="Rectangle 11">
-            <a:extLst>
-              <a:ext uri="{FF2B5EF4-FFF2-40B4-BE49-F238E27FC236}">
-                <a16:creationId xmlns:a16="http://schemas.microsoft.com/office/drawing/2014/main" id="{BC4C4868-CB8F-4AF9-9CDB-8108F2C19B67}"/>
-              </a:ext>
-              <a:ext uri="{C183D7F6-B498-43B3-948B-1728B52AA6E4}">
-                <adec:decorative xmlns:adec="http://schemas.microsoft.com/office/drawing/2017/decorative" val="1"/>
-              </a:ext>
-            </a:extLst>
-          </p:cNvPr>
-          <p:cNvSpPr>
-            <a:spLocks noGrp="1" noRot="1" noChangeAspect="1" noMove="1" noResize="1" noEditPoints="1" noAdjustHandles="1" noChangeArrowheads="1" noChangeShapeType="1" noTextEdit="1"/>
-          </p:cNvSpPr>
-          <p:nvPr>
-            <p:extLst>
-              <p:ext uri="{386F3935-93C4-4BCD-93E2-E3B085C9AB24}">
-                <p16:designElem xmlns:p16="http://schemas.microsoft.com/office/powerpoint/2015/main" val="1"/>
-              </p:ext>
-            </p:extLst>
-          </p:nvPr>
-        </p:nvSpPr>
-        <p:spPr>
-          <a:xfrm rot="10800000" flipH="1">
-            <a:off x="-3" y="0"/>
-            <a:ext cx="8115306" cy="1590742"/>
-          </a:xfrm>
-          <a:prstGeom prst="rect">
-            <a:avLst/>
-          </a:prstGeom>
-          <a:gradFill>
-            <a:gsLst>
-              <a:gs pos="20000">
-                <a:schemeClr val="accent1">
-                  <a:alpha val="0"/>
-                </a:schemeClr>
-              </a:gs>
-              <a:gs pos="100000">
-                <a:schemeClr val="accent1">
-                  <a:lumMod val="50000"/>
-                  <a:alpha val="55000"/>
-                </a:schemeClr>
-              </a:gs>
-            </a:gsLst>
-            <a:lin ang="13800000" scaled="0"/>
-          </a:gradFill>
-          <a:ln>
-            <a:noFill/>
-          </a:ln>
-        </p:spPr>
-        <p:style>
-          <a:lnRef idx="2">
-            <a:schemeClr val="accent1">
-              <a:shade val="50000"/>
-            </a:schemeClr>
-          </a:lnRef>
-          <a:fillRef idx="1">
-            <a:schemeClr val="accent1"/>
-          </a:fillRef>
-          <a:effectRef idx="0">
-            <a:schemeClr val="accent1"/>
-          </a:effectRef>
-          <a:fontRef idx="minor">
-            <a:schemeClr val="lt1"/>
-          </a:fontRef>
-        </p:style>
-        <p:txBody>
-          <a:bodyPr rtlCol="0" anchor="ctr"/>
-          <a:lstStyle/>
-          <a:p>
-            <a:pPr algn="ctr"/>
-            <a:endParaRPr lang="en-US"/>
-          </a:p>
-        </p:txBody>
-      </p:sp>
-      <p:sp>
-        <p:nvSpPr>
-          <p:cNvPr id="14" name="Rectangle 13">
-            <a:extLst>
-              <a:ext uri="{FF2B5EF4-FFF2-40B4-BE49-F238E27FC236}">
-                <a16:creationId xmlns:a16="http://schemas.microsoft.com/office/drawing/2014/main" id="{375E0459-6403-40CD-989D-56A4407CA12E}"/>
-              </a:ext>
-              <a:ext uri="{C183D7F6-B498-43B3-948B-1728B52AA6E4}">
-                <adec:decorative xmlns:adec="http://schemas.microsoft.com/office/drawing/2017/decorative" val="1"/>
-              </a:ext>
-            </a:extLst>
-          </p:cNvPr>
-          <p:cNvSpPr>
-            <a:spLocks noGrp="1" noRot="1" noChangeAspect="1" noMove="1" noResize="1" noEditPoints="1" noAdjustHandles="1" noChangeArrowheads="1" noChangeShapeType="1" noTextEdit="1"/>
-          </p:cNvSpPr>
-          <p:nvPr>
-            <p:extLst>
-              <p:ext uri="{386F3935-93C4-4BCD-93E2-E3B085C9AB24}">
-                <p16:designElem xmlns:p16="http://schemas.microsoft.com/office/powerpoint/2015/main" val="1"/>
-              </p:ext>
-            </p:extLst>
-          </p:nvPr>
-        </p:nvSpPr>
-        <p:spPr>
-          <a:xfrm flipH="1">
-            <a:off x="8115299" y="-1"/>
-            <a:ext cx="4076698" cy="1590742"/>
-          </a:xfrm>
-          <a:prstGeom prst="rect">
-            <a:avLst/>
-          </a:prstGeom>
-          <a:gradFill>
-            <a:gsLst>
-              <a:gs pos="0">
-                <a:schemeClr val="accent1">
-                  <a:alpha val="66000"/>
-                </a:schemeClr>
-              </a:gs>
-              <a:gs pos="100000">
-                <a:srgbClr val="000000">
-                  <a:alpha val="30000"/>
-                </a:srgbClr>
-              </a:gs>
-            </a:gsLst>
-            <a:lin ang="13200000" scaled="0"/>
-          </a:gradFill>
-          <a:ln>
-            <a:noFill/>
-          </a:ln>
-        </p:spPr>
-        <p:style>
-          <a:lnRef idx="2">
-            <a:schemeClr val="accent1">
-              <a:shade val="50000"/>
-            </a:schemeClr>
-          </a:lnRef>
-          <a:fillRef idx="1">
-            <a:schemeClr val="accent1"/>
-          </a:fillRef>
-          <a:effectRef idx="0">
-            <a:schemeClr val="accent1"/>
-          </a:effectRef>
-          <a:fontRef idx="minor">
-            <a:schemeClr val="lt1"/>
-          </a:fontRef>
-        </p:style>
-        <p:txBody>
-          <a:bodyPr rtlCol="0" anchor="ctr"/>
-          <a:lstStyle/>
-          <a:p>
-            <a:pPr algn="ctr"/>
-            <a:endParaRPr lang="en-US"/>
-          </a:p>
-        </p:txBody>
-      </p:sp>
-      <p:sp>
-        <p:nvSpPr>
-          <p:cNvPr id="16" name="Rectangle 15">
-            <a:extLst>
-              <a:ext uri="{FF2B5EF4-FFF2-40B4-BE49-F238E27FC236}">
-                <a16:creationId xmlns:a16="http://schemas.microsoft.com/office/drawing/2014/main" id="{53E5B1A8-3AC9-4BD1-9BBC-78CA94F2D1BA}"/>
-              </a:ext>
-              <a:ext uri="{C183D7F6-B498-43B3-948B-1728B52AA6E4}">
-                <adec:decorative xmlns:adec="http://schemas.microsoft.com/office/drawing/2017/decorative" val="1"/>
-              </a:ext>
-            </a:extLst>
-          </p:cNvPr>
-          <p:cNvSpPr>
-            <a:spLocks noGrp="1" noRot="1" noChangeAspect="1" noMove="1" noResize="1" noEditPoints="1" noAdjustHandles="1" noChangeArrowheads="1" noChangeShapeType="1" noTextEdit="1"/>
-          </p:cNvSpPr>
-          <p:nvPr>
-            <p:extLst>
-              <p:ext uri="{386F3935-93C4-4BCD-93E2-E3B085C9AB24}">
-                <p16:designElem xmlns:p16="http://schemas.microsoft.com/office/powerpoint/2015/main" val="1"/>
-              </p:ext>
-            </p:extLst>
-          </p:nvPr>
-        </p:nvSpPr>
-        <p:spPr>
-          <a:xfrm>
-            <a:off x="459350" y="-1"/>
-            <a:ext cx="11732646" cy="1597433"/>
-          </a:xfrm>
-          <a:prstGeom prst="rect">
-            <a:avLst/>
-          </a:prstGeom>
-          <a:gradFill>
-            <a:gsLst>
-              <a:gs pos="50000">
-                <a:srgbClr val="000000">
-                  <a:alpha val="0"/>
-                </a:srgbClr>
-              </a:gs>
-              <a:gs pos="99000">
-                <a:schemeClr val="accent1">
-                  <a:lumMod val="50000"/>
-                  <a:alpha val="52000"/>
-                </a:schemeClr>
-              </a:gs>
-            </a:gsLst>
-            <a:lin ang="16800000" scaled="0"/>
-          </a:gradFill>
-          <a:ln>
-            <a:noFill/>
-          </a:ln>
-        </p:spPr>
-        <p:style>
-          <a:lnRef idx="2">
-            <a:schemeClr val="accent1">
-              <a:shade val="50000"/>
-            </a:schemeClr>
-          </a:lnRef>
-          <a:fillRef idx="1">
-            <a:schemeClr val="accent1"/>
-          </a:fillRef>
-          <a:effectRef idx="0">
-            <a:schemeClr val="accent1"/>
-          </a:effectRef>
-          <a:fontRef idx="minor">
-            <a:schemeClr val="lt1"/>
-          </a:fontRef>
-        </p:style>
-        <p:txBody>
-          <a:bodyPr rtlCol="0" anchor="ctr"/>
-          <a:lstStyle/>
-          <a:p>
-            <a:pPr algn="ctr"/>
-            <a:endParaRPr lang="en-US"/>
-          </a:p>
-        </p:txBody>
-      </p:sp>
-      <p:sp>
-        <p:nvSpPr>
-          <p:cNvPr id="2" name="Title 1">
-            <a:extLst>
-              <a:ext uri="{FF2B5EF4-FFF2-40B4-BE49-F238E27FC236}">
-                <a16:creationId xmlns:a16="http://schemas.microsoft.com/office/drawing/2014/main" id="{F021F42D-C8FD-AD49-8558-0FBB5D132A79}"/>
-              </a:ext>
-            </a:extLst>
-          </p:cNvPr>
-          <p:cNvSpPr>
-            <a:spLocks noGrp="1"/>
-          </p:cNvSpPr>
-          <p:nvPr>
-            <p:ph type="title"/>
-          </p:nvPr>
-        </p:nvSpPr>
-        <p:spPr>
-          <a:xfrm>
-            <a:off x="1371599" y="294538"/>
-            <a:ext cx="9895951" cy="1033669"/>
-          </a:xfrm>
-        </p:spPr>
-        <p:txBody>
-          <a:bodyPr>
-            <a:normAutofit/>
-          </a:bodyPr>
-          <a:lstStyle/>
-          <a:p>
-            <a:r>
-              <a:rPr lang="ar-AE" sz="4000">
-                <a:solidFill>
-                  <a:srgbClr val="FFFFFF"/>
-                </a:solidFill>
-              </a:rPr>
-              <a:t>الوصف والخلفية</a:t>
-            </a:r>
-            <a:endParaRPr lang="en-US" sz="4000">
-              <a:solidFill>
-                <a:srgbClr val="FFFFFF"/>
-              </a:solidFill>
-            </a:endParaRPr>
-          </a:p>
-        </p:txBody>
-      </p:sp>
-      <p:sp>
-        <p:nvSpPr>
-          <p:cNvPr id="3" name="Content Placeholder 2">
-            <a:extLst>
-              <a:ext uri="{FF2B5EF4-FFF2-40B4-BE49-F238E27FC236}">
-                <a16:creationId xmlns:a16="http://schemas.microsoft.com/office/drawing/2014/main" id="{C523154E-DB46-7F4B-858D-10D18C594AEB}"/>
-              </a:ext>
-            </a:extLst>
-          </p:cNvPr>
-          <p:cNvSpPr>
-            <a:spLocks noGrp="1"/>
-          </p:cNvSpPr>
-          <p:nvPr>
-            <p:ph idx="1"/>
-          </p:nvPr>
-        </p:nvSpPr>
-        <p:spPr>
-          <a:xfrm>
-            <a:off x="1371599" y="2318197"/>
-            <a:ext cx="9724031" cy="3683358"/>
-          </a:xfrm>
-        </p:spPr>
-        <p:txBody>
-          <a:bodyPr anchor="ctr">
-            <a:normAutofit/>
-          </a:bodyPr>
-          <a:lstStyle/>
-          <a:p>
-            <a:pPr marL="0" indent="0">
-              <a:buNone/>
-            </a:pPr>
-            <a:r>
-              <a:rPr lang="ar-AE" sz="1700" dirty="0"/>
-              <a:t>البرنامج مكتوب بلغة البرمجة</a:t>
-            </a:r>
-            <a:r>
-              <a:rPr lang="ar-SA" sz="1700" dirty="0"/>
-              <a:t>: </a:t>
-            </a:r>
-            <a:endParaRPr lang="en-US" sz="1700" dirty="0"/>
-          </a:p>
-          <a:p>
-            <a:pPr marL="0" indent="0">
-              <a:buNone/>
-            </a:pPr>
-            <a:r>
-              <a:rPr lang="en-US" sz="1700" dirty="0"/>
-              <a:t>Python</a:t>
-            </a:r>
-          </a:p>
-          <a:p>
-            <a:pPr marL="0" indent="0">
-              <a:buNone/>
-            </a:pPr>
-            <a:endParaRPr lang="en-US" sz="1700" dirty="0"/>
-          </a:p>
-          <a:p>
-            <a:pPr marL="0" indent="0">
-              <a:buNone/>
-            </a:pPr>
-            <a:r>
-              <a:rPr lang="en-US" sz="1700" u="sng" dirty="0"/>
-              <a:t>Frontend</a:t>
-            </a:r>
-          </a:p>
-          <a:p>
-            <a:pPr marL="0" indent="0">
-              <a:buNone/>
-            </a:pPr>
-            <a:r>
-              <a:rPr lang="ar-AE" sz="1700" dirty="0"/>
-              <a:t>واجهة مستخدم مكتوبة باستخدام وحدة </a:t>
-            </a:r>
-            <a:r>
-              <a:rPr lang="en-US" sz="1700" dirty="0" err="1"/>
-              <a:t>PyQt</a:t>
-            </a:r>
-            <a:endParaRPr lang="en-US" sz="1700" dirty="0"/>
-          </a:p>
-          <a:p>
-            <a:pPr marL="0" indent="0">
-              <a:buNone/>
-            </a:pPr>
-            <a:endParaRPr lang="en-US" sz="1700" dirty="0"/>
-          </a:p>
-          <a:p>
-            <a:pPr marL="0" indent="0">
-              <a:buNone/>
-            </a:pPr>
-            <a:r>
-              <a:rPr lang="en-US" sz="1700" u="sng" dirty="0"/>
-              <a:t>Backend</a:t>
-            </a:r>
-            <a:endParaRPr lang="en-US" sz="1700" dirty="0"/>
-          </a:p>
-          <a:p>
-            <a:pPr marL="0" indent="0">
-              <a:buNone/>
-            </a:pPr>
-            <a:r>
-              <a:rPr lang="en-US" sz="1700" dirty="0"/>
-              <a:t> </a:t>
-            </a:r>
-            <a:r>
-              <a:rPr lang="ar-AE" sz="1700" dirty="0"/>
-              <a:t>فحص عناوين انترنت مع اوامر </a:t>
-            </a:r>
-            <a:r>
-              <a:rPr lang="en-US" sz="1700" dirty="0" err="1"/>
-              <a:t>nmap</a:t>
-            </a:r>
-            <a:endParaRPr lang="en-US" sz="1700" dirty="0"/>
-          </a:p>
-          <a:p>
-            <a:pPr marL="0" indent="0">
-              <a:buNone/>
-            </a:pPr>
-            <a:r>
-              <a:rPr lang="en-US" sz="1700" dirty="0"/>
-              <a:t>Async functions supported</a:t>
-            </a:r>
-          </a:p>
-          <a:p>
-            <a:pPr marL="0" indent="0">
-              <a:buNone/>
-            </a:pPr>
-            <a:r>
-              <a:rPr lang="ar-AE" sz="1700" dirty="0"/>
-              <a:t>تعريف وبحث عن الثغرات باستخدام خدمة </a:t>
-            </a:r>
-            <a:r>
-              <a:rPr lang="en-US" sz="1700" dirty="0"/>
-              <a:t>NVD API</a:t>
-            </a:r>
-          </a:p>
-        </p:txBody>
-      </p:sp>
-    </p:spTree>
-    <p:extLst>
-      <p:ext uri="{BB962C8B-B14F-4D97-AF65-F5344CB8AC3E}">
-        <p14:creationId xmlns:p14="http://schemas.microsoft.com/office/powerpoint/2010/main" val="205484818"/>
-      </p:ext>
-    </p:extLst>
-  </p:cSld>
-  <p:clrMapOvr>
-    <a:masterClrMapping/>
-  </p:clrMapOvr>
-</p:sld>
-</file>
-
-<file path=ppt/slides/slide4.xml><?xml version="1.0" encoding="utf-8"?>
-<p:sld xmlns:a="http://schemas.openxmlformats.org/drawingml/2006/main" xmlns:r="http://schemas.openxmlformats.org/officeDocument/2006/relationships" xmlns:p="http://schemas.openxmlformats.org/presentationml/2006/main">
-  <p:cSld>
-    <p:spTree>
-      <p:nvGrpSpPr>
-        <p:cNvPr id="1" name=""/>
-        <p:cNvGrpSpPr/>
-        <p:nvPr/>
-      </p:nvGrpSpPr>
-      <p:grpSpPr>
-        <a:xfrm>
-          <a:off x="0" y="0"/>
-          <a:ext cx="0" cy="0"/>
-          <a:chOff x="0" y="0"/>
-          <a:chExt cx="0" cy="0"/>
-        </a:xfrm>
-      </p:grpSpPr>
-      <p:sp>
-        <p:nvSpPr>
-          <p:cNvPr id="2" name="Title 1">
-            <a:extLst>
-              <a:ext uri="{FF2B5EF4-FFF2-40B4-BE49-F238E27FC236}">
-                <a16:creationId xmlns:a16="http://schemas.microsoft.com/office/drawing/2014/main" id="{CFE1F2CC-60FC-6740-9398-472D589542C4}"/>
-              </a:ext>
-            </a:extLst>
-          </p:cNvPr>
-          <p:cNvSpPr>
-            <a:spLocks noGrp="1"/>
-          </p:cNvSpPr>
-          <p:nvPr>
-            <p:ph type="title"/>
-          </p:nvPr>
-        </p:nvSpPr>
-        <p:spPr/>
-        <p:txBody>
-          <a:bodyPr/>
-          <a:lstStyle/>
-          <a:p>
-            <a:r>
-              <a:rPr lang="en-US" dirty="0"/>
-              <a:t>Flowchart</a:t>
-            </a:r>
-          </a:p>
-        </p:txBody>
-      </p:sp>
-      <p:pic>
-        <p:nvPicPr>
-          <p:cNvPr id="5" name="Content Placeholder 4">
-            <a:extLst>
-              <a:ext uri="{FF2B5EF4-FFF2-40B4-BE49-F238E27FC236}">
-                <a16:creationId xmlns:a16="http://schemas.microsoft.com/office/drawing/2014/main" id="{B7B75901-EAFF-4AAF-B9CF-2418F6603172}"/>
-              </a:ext>
-            </a:extLst>
-          </p:cNvPr>
-          <p:cNvPicPr>
-            <a:picLocks noGrp="1" noChangeAspect="1"/>
-          </p:cNvPicPr>
-          <p:nvPr>
-            <p:ph idx="1"/>
-          </p:nvPr>
-        </p:nvPicPr>
-        <p:blipFill>
-          <a:blip r:embed="rId2"/>
-          <a:stretch>
-            <a:fillRect/>
-          </a:stretch>
-        </p:blipFill>
-        <p:spPr>
-          <a:xfrm>
-            <a:off x="434106" y="1337693"/>
-            <a:ext cx="11323788" cy="5327202"/>
-          </a:xfrm>
-        </p:spPr>
-      </p:pic>
-    </p:spTree>
-    <p:extLst>
-      <p:ext uri="{BB962C8B-B14F-4D97-AF65-F5344CB8AC3E}">
-        <p14:creationId xmlns:p14="http://schemas.microsoft.com/office/powerpoint/2010/main" val="3746758601"/>
-      </p:ext>
-    </p:extLst>
-  </p:cSld>
-  <p:clrMapOvr>
-    <a:masterClrMapping/>
-  </p:clrMapOvr>
-</p:sld>
-</file>
-
-<file path=ppt/slides/slide5.xml><?xml version="1.0" encoding="utf-8"?>
-<p:sld xmlns:a="http://schemas.openxmlformats.org/drawingml/2006/main" xmlns:r="http://schemas.openxmlformats.org/officeDocument/2006/relationships" xmlns:p="http://schemas.openxmlformats.org/presentationml/2006/main">
-  <p:cSld>
-    <p:spTree>
-      <p:nvGrpSpPr>
-        <p:cNvPr id="1" name=""/>
-        <p:cNvGrpSpPr/>
-        <p:nvPr/>
-      </p:nvGrpSpPr>
-      <p:grpSpPr>
-        <a:xfrm>
-          <a:off x="0" y="0"/>
-          <a:ext cx="0" cy="0"/>
-          <a:chOff x="0" y="0"/>
-          <a:chExt cx="0" cy="0"/>
-        </a:xfrm>
-      </p:grpSpPr>
-      <p:sp>
-        <p:nvSpPr>
-          <p:cNvPr id="2" name="Title 1">
-            <a:extLst>
-              <a:ext uri="{FF2B5EF4-FFF2-40B4-BE49-F238E27FC236}">
-                <a16:creationId xmlns:a16="http://schemas.microsoft.com/office/drawing/2014/main" id="{90236D24-AFE1-2A45-8ADD-F86DF08076CB}"/>
-              </a:ext>
-            </a:extLst>
-          </p:cNvPr>
-          <p:cNvSpPr>
-            <a:spLocks noGrp="1"/>
-          </p:cNvSpPr>
-          <p:nvPr>
-            <p:ph type="title"/>
-          </p:nvPr>
-        </p:nvSpPr>
-        <p:spPr/>
-        <p:txBody>
-          <a:bodyPr/>
-          <a:lstStyle/>
-          <a:p>
-            <a:pPr algn="r"/>
-            <a:r>
-              <a:rPr lang="ar-AE" dirty="0"/>
-              <a:t>مثال شاشة تشغيل البرنامج</a:t>
-            </a:r>
-            <a:endParaRPr lang="en-US" dirty="0"/>
-          </a:p>
-        </p:txBody>
-      </p:sp>
-      <p:pic>
-        <p:nvPicPr>
-          <p:cNvPr id="11" name="Content Placeholder 10" descr="A screenshot of a computer&#10;&#10;Description automatically generated">
-            <a:extLst>
-              <a:ext uri="{FF2B5EF4-FFF2-40B4-BE49-F238E27FC236}">
-                <a16:creationId xmlns:a16="http://schemas.microsoft.com/office/drawing/2014/main" id="{127AC702-98A3-8E41-BE1D-6CA6560395A2}"/>
-              </a:ext>
-            </a:extLst>
-          </p:cNvPr>
-          <p:cNvPicPr>
-            <a:picLocks noGrp="1" noChangeAspect="1"/>
-          </p:cNvPicPr>
-          <p:nvPr>
-            <p:ph idx="1"/>
-          </p:nvPr>
-        </p:nvPicPr>
-        <p:blipFill>
-          <a:blip r:embed="rId2"/>
-          <a:stretch>
-            <a:fillRect/>
-          </a:stretch>
-        </p:blipFill>
-        <p:spPr>
-          <a:xfrm>
-            <a:off x="367192" y="2066539"/>
-            <a:ext cx="3549714" cy="3734347"/>
-          </a:xfrm>
-        </p:spPr>
-      </p:pic>
-      <p:pic>
-        <p:nvPicPr>
-          <p:cNvPr id="13" name="Picture 12" descr="A screenshot of a computer&#10;&#10;Description automatically generated">
-            <a:extLst>
-              <a:ext uri="{FF2B5EF4-FFF2-40B4-BE49-F238E27FC236}">
-                <a16:creationId xmlns:a16="http://schemas.microsoft.com/office/drawing/2014/main" id="{271BD6D3-8448-794F-91E2-06FD8D9063C1}"/>
-              </a:ext>
-            </a:extLst>
-          </p:cNvPr>
-          <p:cNvPicPr>
-            <a:picLocks noChangeAspect="1"/>
-          </p:cNvPicPr>
-          <p:nvPr/>
-        </p:nvPicPr>
-        <p:blipFill>
-          <a:blip r:embed="rId3"/>
-          <a:stretch>
-            <a:fillRect/>
-          </a:stretch>
-        </p:blipFill>
-        <p:spPr>
-          <a:xfrm>
-            <a:off x="4200087" y="2098894"/>
-            <a:ext cx="3549715" cy="3669638"/>
-          </a:xfrm>
-          <a:prstGeom prst="rect">
-            <a:avLst/>
-          </a:prstGeom>
-        </p:spPr>
-      </p:pic>
-      <p:pic>
-        <p:nvPicPr>
-          <p:cNvPr id="15" name="Picture 14" descr="A screenshot of a computer&#10;&#10;Description automatically generated">
-            <a:extLst>
-              <a:ext uri="{FF2B5EF4-FFF2-40B4-BE49-F238E27FC236}">
-                <a16:creationId xmlns:a16="http://schemas.microsoft.com/office/drawing/2014/main" id="{63F0990C-239F-8D4B-9C98-53FC0C92CC2F}"/>
-              </a:ext>
-            </a:extLst>
-          </p:cNvPr>
-          <p:cNvPicPr>
-            <a:picLocks noChangeAspect="1"/>
-          </p:cNvPicPr>
-          <p:nvPr/>
-        </p:nvPicPr>
-        <p:blipFill>
-          <a:blip r:embed="rId4"/>
-          <a:stretch>
-            <a:fillRect/>
-          </a:stretch>
-        </p:blipFill>
-        <p:spPr>
-          <a:xfrm>
-            <a:off x="8032983" y="2098895"/>
-            <a:ext cx="3549714" cy="3645008"/>
-          </a:xfrm>
-          <a:prstGeom prst="rect">
-            <a:avLst/>
-          </a:prstGeom>
-        </p:spPr>
-      </p:pic>
-    </p:spTree>
-    <p:extLst>
-      <p:ext uri="{BB962C8B-B14F-4D97-AF65-F5344CB8AC3E}">
-        <p14:creationId xmlns:p14="http://schemas.microsoft.com/office/powerpoint/2010/main" val="1613703189"/>
-      </p:ext>
-    </p:extLst>
-  </p:cSld>
-  <p:clrMapOvr>
-    <a:masterClrMapping/>
-  </p:clrMapOvr>
-</p:sld>
-</file>
-
-<file path=ppt/slides/slide6.xml><?xml version="1.0" encoding="utf-8"?>
-<p:sld xmlns:a="http://schemas.openxmlformats.org/drawingml/2006/main" xmlns:r="http://schemas.openxmlformats.org/officeDocument/2006/relationships" xmlns:p="http://schemas.openxmlformats.org/presentationml/2006/main">
-  <p:cSld>
-    <p:spTree>
-      <p:nvGrpSpPr>
-        <p:cNvPr id="1" name=""/>
-        <p:cNvGrpSpPr/>
-        <p:nvPr/>
-      </p:nvGrpSpPr>
-      <p:grpSpPr>
-        <a:xfrm>
-          <a:off x="0" y="0"/>
-          <a:ext cx="0" cy="0"/>
-          <a:chOff x="0" y="0"/>
-          <a:chExt cx="0" cy="0"/>
-        </a:xfrm>
-      </p:grpSpPr>
-      <p:sp>
-        <p:nvSpPr>
-          <p:cNvPr id="2" name="Title 1">
-            <a:extLst>
-              <a:ext uri="{FF2B5EF4-FFF2-40B4-BE49-F238E27FC236}">
-                <a16:creationId xmlns:a16="http://schemas.microsoft.com/office/drawing/2014/main" id="{90236D24-AFE1-2A45-8ADD-F86DF08076CB}"/>
-              </a:ext>
-            </a:extLst>
-          </p:cNvPr>
-          <p:cNvSpPr>
-            <a:spLocks noGrp="1"/>
-          </p:cNvSpPr>
-          <p:nvPr>
-            <p:ph type="title"/>
-          </p:nvPr>
-        </p:nvSpPr>
-        <p:spPr/>
-        <p:txBody>
-          <a:bodyPr/>
-          <a:lstStyle/>
-          <a:p>
-            <a:pPr algn="r"/>
-            <a:r>
-              <a:rPr lang="ar-AE" dirty="0"/>
-              <a:t>مثال شاشة تشغيل البرنامج</a:t>
-            </a:r>
-            <a:endParaRPr lang="en-US" dirty="0"/>
-          </a:p>
-        </p:txBody>
-      </p:sp>
-      <p:pic>
-        <p:nvPicPr>
-          <p:cNvPr id="6" name="Content Placeholder 5" descr="A screenshot of a computer&#10;&#10;Description automatically generated">
-            <a:extLst>
-              <a:ext uri="{FF2B5EF4-FFF2-40B4-BE49-F238E27FC236}">
-                <a16:creationId xmlns:a16="http://schemas.microsoft.com/office/drawing/2014/main" id="{3597C1D5-B4FA-EC4D-A539-B005537FD448}"/>
-              </a:ext>
-            </a:extLst>
-          </p:cNvPr>
-          <p:cNvPicPr>
-            <a:picLocks noGrp="1" noChangeAspect="1"/>
-          </p:cNvPicPr>
-          <p:nvPr>
-            <p:ph idx="1"/>
-          </p:nvPr>
-        </p:nvPicPr>
-        <p:blipFill>
-          <a:blip r:embed="rId2"/>
-          <a:stretch>
-            <a:fillRect/>
-          </a:stretch>
-        </p:blipFill>
-        <p:spPr>
-          <a:xfrm>
-            <a:off x="1559862" y="1836136"/>
-            <a:ext cx="4174454" cy="4351338"/>
-          </a:xfrm>
-        </p:spPr>
-      </p:pic>
-      <p:pic>
-        <p:nvPicPr>
-          <p:cNvPr id="8" name="Picture 7" descr="A screenshot of a computer&#10;&#10;Description automatically generated">
-            <a:extLst>
-              <a:ext uri="{FF2B5EF4-FFF2-40B4-BE49-F238E27FC236}">
-                <a16:creationId xmlns:a16="http://schemas.microsoft.com/office/drawing/2014/main" id="{88A962FD-9746-A443-BBE5-7CC8416394D8}"/>
-              </a:ext>
-            </a:extLst>
-          </p:cNvPr>
-          <p:cNvPicPr>
-            <a:picLocks noChangeAspect="1"/>
-          </p:cNvPicPr>
-          <p:nvPr/>
-        </p:nvPicPr>
-        <p:blipFill>
-          <a:blip r:embed="rId3"/>
-          <a:stretch>
-            <a:fillRect/>
-          </a:stretch>
-        </p:blipFill>
-        <p:spPr>
-          <a:xfrm>
-            <a:off x="6096001" y="1817743"/>
-            <a:ext cx="4174454" cy="4355347"/>
-          </a:xfrm>
-          <a:prstGeom prst="rect">
-            <a:avLst/>
-          </a:prstGeom>
-        </p:spPr>
-      </p:pic>
-    </p:spTree>
-    <p:extLst>
-      <p:ext uri="{BB962C8B-B14F-4D97-AF65-F5344CB8AC3E}">
-        <p14:creationId xmlns:p14="http://schemas.microsoft.com/office/powerpoint/2010/main" val="2828524470"/>
-      </p:ext>
-    </p:extLst>
-  </p:cSld>
-  <p:clrMapOvr>
-    <a:masterClrMapping/>
-  </p:clrMapOvr>
-</p:sld>
-</file>
-
-<file path=ppt/slides/slide7.xml><?xml version="1.0" encoding="utf-8"?>
-<p:sld xmlns:a="http://schemas.openxmlformats.org/drawingml/2006/main" xmlns:r="http://schemas.openxmlformats.org/officeDocument/2006/relationships" xmlns:p="http://schemas.openxmlformats.org/presentationml/2006/main">
-  <p:cSld>
-    <p:bg>
-      <p:bgPr>
-        <a:solidFill>
-          <a:schemeClr val="bg1"/>
-        </a:solidFill>
-        <a:effectLst/>
-      </p:bgPr>
-    </p:bg>
-    <p:spTree>
-      <p:nvGrpSpPr>
-        <p:cNvPr id="1" name=""/>
-        <p:cNvGrpSpPr/>
-        <p:nvPr/>
-      </p:nvGrpSpPr>
-      <p:grpSpPr>
-        <a:xfrm>
-          <a:off x="0" y="0"/>
-          <a:ext cx="0" cy="0"/>
-          <a:chOff x="0" y="0"/>
-          <a:chExt cx="0" cy="0"/>
-        </a:xfrm>
-      </p:grpSpPr>
-      <p:sp useBgFill="1">
-        <p:nvSpPr>
-          <p:cNvPr id="9" name="Rectangle 8">
-            <a:extLst>
-              <a:ext uri="{FF2B5EF4-FFF2-40B4-BE49-F238E27FC236}">
-                <a16:creationId xmlns:a16="http://schemas.microsoft.com/office/drawing/2014/main" id="{BACC6370-2D7E-4714-9D71-7542949D7D5D}"/>
-              </a:ext>
-              <a:ext uri="{C183D7F6-B498-43B3-948B-1728B52AA6E4}">
-                <adec:decorative xmlns:adec="http://schemas.microsoft.com/office/drawing/2017/decorative" val="1"/>
-              </a:ext>
-            </a:extLst>
-          </p:cNvPr>
-          <p:cNvSpPr>
-            <a:spLocks noGrp="1" noRot="1" noChangeAspect="1" noMove="1" noResize="1" noEditPoints="1" noAdjustHandles="1" noChangeArrowheads="1" noChangeShapeType="1" noTextEdit="1"/>
-          </p:cNvSpPr>
-          <p:nvPr>
-            <p:extLst>
-              <p:ext uri="{386F3935-93C4-4BCD-93E2-E3B085C9AB24}">
-                <p16:designElem xmlns:p16="http://schemas.microsoft.com/office/powerpoint/2015/main" val="1"/>
-              </p:ext>
-            </p:extLst>
-          </p:nvPr>
-        </p:nvSpPr>
-        <p:spPr>
-          <a:xfrm>
-            <a:off x="0" y="0"/>
-            <a:ext cx="12192000" cy="6858000"/>
-          </a:xfrm>
-          <a:prstGeom prst="rect">
-            <a:avLst/>
-          </a:prstGeom>
-          <a:ln w="12700" cap="flat" cmpd="sng" algn="ctr">
-            <a:noFill/>
-            <a:prstDash val="solid"/>
-            <a:miter lim="800000"/>
-          </a:ln>
-          <a:effectLst/>
-          <a:extLst>
-            <a:ext uri="{91240B29-F687-4F45-9708-019B960494DF}">
-              <a14:hiddenLine xmlns:a14="http://schemas.microsoft.com/office/drawing/2010/main" w="12700" cap="flat" cmpd="sng" algn="ctr">
-                <a:solidFill>
-                  <a:schemeClr val="accent1">
-                    <a:shade val="50000"/>
-                  </a:schemeClr>
-                </a:solidFill>
-                <a:prstDash val="solid"/>
-                <a:miter lim="800000"/>
-              </a14:hiddenLine>
-            </a:ext>
-          </a:extLst>
-        </p:spPr>
-        <p:style>
-          <a:lnRef idx="2">
-            <a:schemeClr val="accent1">
-              <a:shade val="50000"/>
-            </a:schemeClr>
-          </a:lnRef>
-          <a:fillRef idx="1">
-            <a:schemeClr val="accent1"/>
-          </a:fillRef>
-          <a:effectRef idx="0">
-            <a:schemeClr val="accent1"/>
-          </a:effectRef>
-          <a:fontRef idx="minor">
-            <a:schemeClr val="lt1"/>
-          </a:fontRef>
-        </p:style>
-        <p:txBody>
-          <a:bodyPr rtlCol="0" anchor="ctr"/>
-          <a:lstStyle/>
-          <a:p>
-            <a:pPr algn="ctr"/>
-            <a:endParaRPr lang="en-US"/>
-          </a:p>
-        </p:txBody>
-      </p:sp>
-      <p:sp>
-        <p:nvSpPr>
-          <p:cNvPr id="11" name="Rectangle 10">
-            <a:extLst>
-              <a:ext uri="{FF2B5EF4-FFF2-40B4-BE49-F238E27FC236}">
-                <a16:creationId xmlns:a16="http://schemas.microsoft.com/office/drawing/2014/main" id="{F68B3F68-107C-434F-AA38-110D5EA91B85}"/>
-              </a:ext>
-              <a:ext uri="{C183D7F6-B498-43B3-948B-1728B52AA6E4}">
-                <adec:decorative xmlns:adec="http://schemas.microsoft.com/office/drawing/2017/decorative" val="1"/>
-              </a:ext>
-            </a:extLst>
-          </p:cNvPr>
-          <p:cNvSpPr>
-            <a:spLocks noGrp="1" noRot="1" noChangeAspect="1" noMove="1" noResize="1" noEditPoints="1" noAdjustHandles="1" noChangeArrowheads="1" noChangeShapeType="1" noTextEdit="1"/>
-          </p:cNvSpPr>
-          <p:nvPr>
-            <p:extLst>
-              <p:ext uri="{386F3935-93C4-4BCD-93E2-E3B085C9AB24}">
-                <p16:designElem xmlns:p16="http://schemas.microsoft.com/office/powerpoint/2015/main" val="1"/>
-              </p:ext>
-            </p:extLst>
-          </p:nvPr>
-        </p:nvSpPr>
-        <p:spPr>
-          <a:xfrm flipH="1">
-            <a:off x="2" y="0"/>
-            <a:ext cx="12191998" cy="1575955"/>
-          </a:xfrm>
-          <a:prstGeom prst="rect">
-            <a:avLst/>
-          </a:prstGeom>
-          <a:gradFill>
-            <a:gsLst>
-              <a:gs pos="0">
-                <a:srgbClr val="000000">
-                  <a:alpha val="96000"/>
-                </a:srgbClr>
-              </a:gs>
-              <a:gs pos="100000">
-                <a:schemeClr val="accent1">
-                  <a:lumMod val="75000"/>
-                </a:schemeClr>
-              </a:gs>
-            </a:gsLst>
-            <a:lin ang="8400000" scaled="0"/>
-          </a:gradFill>
-          <a:ln>
-            <a:noFill/>
-          </a:ln>
-        </p:spPr>
-        <p:style>
-          <a:lnRef idx="2">
-            <a:schemeClr val="accent1">
-              <a:shade val="50000"/>
-            </a:schemeClr>
-          </a:lnRef>
-          <a:fillRef idx="1">
-            <a:schemeClr val="accent1"/>
-          </a:fillRef>
-          <a:effectRef idx="0">
-            <a:schemeClr val="accent1"/>
-          </a:effectRef>
-          <a:fontRef idx="minor">
-            <a:schemeClr val="lt1"/>
-          </a:fontRef>
-        </p:style>
-        <p:txBody>
-          <a:bodyPr rtlCol="0" anchor="ctr"/>
-          <a:lstStyle/>
-          <a:p>
-            <a:pPr algn="ctr"/>
-            <a:endParaRPr lang="en-US"/>
-          </a:p>
-        </p:txBody>
-      </p:sp>
-      <p:sp>
-        <p:nvSpPr>
-          <p:cNvPr id="13" name="Rectangle 12">
-            <a:extLst>
-              <a:ext uri="{FF2B5EF4-FFF2-40B4-BE49-F238E27FC236}">
-                <a16:creationId xmlns:a16="http://schemas.microsoft.com/office/drawing/2014/main" id="{AAD0DBB9-1A4B-4391-81D4-CB19F9AB918A}"/>
-              </a:ext>
-              <a:ext uri="{C183D7F6-B498-43B3-948B-1728B52AA6E4}">
-                <adec:decorative xmlns:adec="http://schemas.microsoft.com/office/drawing/2017/decorative" val="1"/>
-              </a:ext>
-            </a:extLst>
-          </p:cNvPr>
-          <p:cNvSpPr>
-            <a:spLocks noGrp="1" noRot="1" noChangeAspect="1" noMove="1" noResize="1" noEditPoints="1" noAdjustHandles="1" noChangeArrowheads="1" noChangeShapeType="1" noTextEdit="1"/>
-          </p:cNvSpPr>
-          <p:nvPr>
-            <p:extLst>
-              <p:ext uri="{386F3935-93C4-4BCD-93E2-E3B085C9AB24}">
-                <p16:designElem xmlns:p16="http://schemas.microsoft.com/office/powerpoint/2015/main" val="1"/>
-              </p:ext>
-            </p:extLst>
-          </p:nvPr>
-        </p:nvSpPr>
-        <p:spPr>
-          <a:xfrm rot="10800000" flipH="1">
-            <a:off x="8128857" y="0"/>
-            <a:ext cx="4063143" cy="1576412"/>
-          </a:xfrm>
-          <a:prstGeom prst="rect">
-            <a:avLst/>
-          </a:prstGeom>
-          <a:gradFill>
-            <a:gsLst>
-              <a:gs pos="19000">
-                <a:schemeClr val="accent1">
-                  <a:lumMod val="50000"/>
-                  <a:alpha val="68000"/>
-                </a:schemeClr>
-              </a:gs>
-              <a:gs pos="100000">
-                <a:schemeClr val="accent1">
-                  <a:alpha val="79000"/>
-                </a:schemeClr>
-              </a:gs>
-            </a:gsLst>
-            <a:lin ang="19200000" scaled="0"/>
-          </a:gradFill>
-          <a:ln>
-            <a:noFill/>
-          </a:ln>
-        </p:spPr>
-        <p:style>
-          <a:lnRef idx="2">
-            <a:schemeClr val="accent1">
-              <a:shade val="50000"/>
-            </a:schemeClr>
-          </a:lnRef>
-          <a:fillRef idx="1">
-            <a:schemeClr val="accent1"/>
-          </a:fillRef>
-          <a:effectRef idx="0">
-            <a:schemeClr val="accent1"/>
-          </a:effectRef>
-          <a:fontRef idx="minor">
-            <a:schemeClr val="lt1"/>
-          </a:fontRef>
-        </p:style>
-        <p:txBody>
-          <a:bodyPr rtlCol="0" anchor="ctr"/>
-          <a:lstStyle/>
-          <a:p>
-            <a:pPr algn="ctr"/>
-            <a:endParaRPr lang="en-US"/>
-          </a:p>
-        </p:txBody>
-      </p:sp>
-      <p:sp>
-        <p:nvSpPr>
-          <p:cNvPr id="15" name="Rectangle 14">
-            <a:extLst>
-              <a:ext uri="{FF2B5EF4-FFF2-40B4-BE49-F238E27FC236}">
-                <a16:creationId xmlns:a16="http://schemas.microsoft.com/office/drawing/2014/main" id="{063BBA22-50EA-4C4D-BE05-F1CE4E63AA56}"/>
-              </a:ext>
-              <a:ext uri="{C183D7F6-B498-43B3-948B-1728B52AA6E4}">
-                <adec:decorative xmlns:adec="http://schemas.microsoft.com/office/drawing/2017/decorative" val="1"/>
-              </a:ext>
-            </a:extLst>
-          </p:cNvPr>
-          <p:cNvSpPr>
-            <a:spLocks noGrp="1" noRot="1" noChangeAspect="1" noMove="1" noResize="1" noEditPoints="1" noAdjustHandles="1" noChangeArrowheads="1" noChangeShapeType="1" noTextEdit="1"/>
-          </p:cNvSpPr>
-          <p:nvPr>
-            <p:extLst>
-              <p:ext uri="{386F3935-93C4-4BCD-93E2-E3B085C9AB24}">
-                <p16:designElem xmlns:p16="http://schemas.microsoft.com/office/powerpoint/2015/main" val="1"/>
-              </p:ext>
-            </p:extLst>
-          </p:nvPr>
-        </p:nvSpPr>
-        <p:spPr>
-          <a:xfrm rot="5400000">
-            <a:off x="5307777" y="-5307778"/>
-            <a:ext cx="1576446" cy="12192002"/>
-          </a:xfrm>
-          <a:prstGeom prst="rect">
-            <a:avLst/>
-          </a:prstGeom>
-          <a:gradFill>
-            <a:gsLst>
-              <a:gs pos="23000">
-                <a:schemeClr val="accent1">
-                  <a:alpha val="0"/>
-                </a:schemeClr>
-              </a:gs>
-              <a:gs pos="99000">
-                <a:srgbClr val="000000">
-                  <a:alpha val="74000"/>
-                </a:srgbClr>
-              </a:gs>
-            </a:gsLst>
-            <a:lin ang="20400000" scaled="0"/>
-          </a:gradFill>
-          <a:ln>
-            <a:noFill/>
-          </a:ln>
-        </p:spPr>
-        <p:style>
-          <a:lnRef idx="2">
-            <a:schemeClr val="accent1">
-              <a:shade val="50000"/>
-            </a:schemeClr>
-          </a:lnRef>
-          <a:fillRef idx="1">
-            <a:schemeClr val="accent1"/>
-          </a:fillRef>
-          <a:effectRef idx="0">
-            <a:schemeClr val="accent1"/>
-          </a:effectRef>
-          <a:fontRef idx="minor">
-            <a:schemeClr val="lt1"/>
-          </a:fontRef>
-        </p:style>
-        <p:txBody>
-          <a:bodyPr rtlCol="0" anchor="ctr"/>
-          <a:lstStyle/>
-          <a:p>
-            <a:pPr algn="ctr"/>
-            <a:endParaRPr lang="en-US" dirty="0"/>
-          </a:p>
-        </p:txBody>
-      </p:sp>
-      <p:sp>
-        <p:nvSpPr>
-          <p:cNvPr id="2" name="Title 1">
-            <a:extLst>
-              <a:ext uri="{FF2B5EF4-FFF2-40B4-BE49-F238E27FC236}">
-                <a16:creationId xmlns:a16="http://schemas.microsoft.com/office/drawing/2014/main" id="{9925ABEB-B8C6-4CC7-8A23-A10364A90D08}"/>
-              </a:ext>
-            </a:extLst>
-          </p:cNvPr>
-          <p:cNvSpPr>
-            <a:spLocks noGrp="1"/>
-          </p:cNvSpPr>
-          <p:nvPr>
-            <p:ph type="title"/>
-          </p:nvPr>
-        </p:nvSpPr>
-        <p:spPr>
-          <a:xfrm>
-            <a:off x="1371597" y="348865"/>
-            <a:ext cx="10044023" cy="877729"/>
-          </a:xfrm>
-        </p:spPr>
-        <p:txBody>
-          <a:bodyPr anchor="ctr">
-            <a:normAutofit/>
-          </a:bodyPr>
-          <a:lstStyle/>
-          <a:p>
-            <a:pPr marL="0" marR="0">
-              <a:spcBef>
-                <a:spcPts val="0"/>
-              </a:spcBef>
-              <a:spcAft>
-                <a:spcPts val="800"/>
-              </a:spcAft>
-            </a:pPr>
-            <a:r>
-              <a:rPr lang="ar-KW" sz="4000" dirty="0">
-                <a:solidFill>
-                  <a:srgbClr val="FFFFFF"/>
-                </a:solidFill>
-                <a:effectLst/>
-                <a:latin typeface="Calibri" panose="020F0502020204030204" pitchFamily="34" charset="0"/>
-                <a:ea typeface="Calibri" panose="020F0502020204030204" pitchFamily="34" charset="0"/>
-                <a:cs typeface="Arial" panose="020B0604020202020204" pitchFamily="34" charset="0"/>
-              </a:rPr>
-              <a:t>المشاكل الحالية</a:t>
-            </a:r>
-            <a:endParaRPr lang="en-US" sz="4000" dirty="0">
-              <a:solidFill>
-                <a:srgbClr val="FFFFFF"/>
-              </a:solidFill>
-              <a:effectLst/>
-              <a:latin typeface="Calibri" panose="020F0502020204030204" pitchFamily="34" charset="0"/>
-              <a:ea typeface="Calibri" panose="020F0502020204030204" pitchFamily="34" charset="0"/>
-              <a:cs typeface="Arial" panose="020B0604020202020204" pitchFamily="34" charset="0"/>
-            </a:endParaRPr>
-          </a:p>
-        </p:txBody>
-      </p:sp>
-      <p:graphicFrame>
-        <p:nvGraphicFramePr>
-          <p:cNvPr id="5" name="Content Placeholder 2">
-            <a:extLst>
-              <a:ext uri="{FF2B5EF4-FFF2-40B4-BE49-F238E27FC236}">
-                <a16:creationId xmlns:a16="http://schemas.microsoft.com/office/drawing/2014/main" id="{5E8B2A4C-4543-25F7-2F5D-67AD4499392C}"/>
-              </a:ext>
-            </a:extLst>
-          </p:cNvPr>
-          <p:cNvGraphicFramePr>
-            <a:graphicFrameLocks noGrp="1"/>
-          </p:cNvGraphicFramePr>
-          <p:nvPr>
-            <p:ph idx="1"/>
-            <p:extLst>
-              <p:ext uri="{D42A27DB-BD31-4B8C-83A1-F6EECF244321}">
-                <p14:modId xmlns:p14="http://schemas.microsoft.com/office/powerpoint/2010/main" val="4047471720"/>
-              </p:ext>
-            </p:extLst>
-          </p:nvPr>
-        </p:nvGraphicFramePr>
-        <p:xfrm>
-          <a:off x="644056" y="2112579"/>
-          <a:ext cx="10927829" cy="4192805"/>
-        </p:xfrm>
-        <a:graphic>
-          <a:graphicData uri="http://schemas.openxmlformats.org/drawingml/2006/diagram">
-            <dgm:relIds xmlns:dgm="http://schemas.openxmlformats.org/drawingml/2006/diagram" xmlns:r="http://schemas.openxmlformats.org/officeDocument/2006/relationships" r:dm="rId2" r:lo="rId3" r:qs="rId4" r:cs="rId5"/>
-          </a:graphicData>
-        </a:graphic>
-      </p:graphicFrame>
-    </p:spTree>
-    <p:extLst>
-      <p:ext uri="{BB962C8B-B14F-4D97-AF65-F5344CB8AC3E}">
-        <p14:creationId xmlns:p14="http://schemas.microsoft.com/office/powerpoint/2010/main" val="1069822785"/>
-      </p:ext>
-    </p:extLst>
-  </p:cSld>
-  <p:clrMapOvr>
-    <a:masterClrMapping/>
-  </p:clrMapOvr>
-</p:sld>
-</file>
-
-<file path=ppt/slides/slide8.xml><?xml version="1.0" encoding="utf-8"?>
+<file path=ppt/slides/slide10.xml><?xml version="1.0" encoding="utf-8"?>
 <p:sld xmlns:a="http://schemas.openxmlformats.org/drawingml/2006/main" xmlns:r="http://schemas.openxmlformats.org/officeDocument/2006/relationships" xmlns:p="http://schemas.openxmlformats.org/presentationml/2006/main">
   <p:cSld>
     <p:bg>
@@ -11191,6 +9721,2569 @@
     <p:extLst>
       <p:ext uri="{BB962C8B-B14F-4D97-AF65-F5344CB8AC3E}">
         <p14:creationId xmlns:p14="http://schemas.microsoft.com/office/powerpoint/2010/main" val="2800781779"/>
+      </p:ext>
+    </p:extLst>
+  </p:cSld>
+  <p:clrMapOvr>
+    <a:masterClrMapping/>
+  </p:clrMapOvr>
+</p:sld>
+</file>
+
+<file path=ppt/slides/slide2.xml><?xml version="1.0" encoding="utf-8"?>
+<p:sld xmlns:a="http://schemas.openxmlformats.org/drawingml/2006/main" xmlns:r="http://schemas.openxmlformats.org/officeDocument/2006/relationships" xmlns:p="http://schemas.openxmlformats.org/presentationml/2006/main">
+  <p:cSld>
+    <p:bg>
+      <p:bgPr>
+        <a:solidFill>
+          <a:schemeClr val="bg1"/>
+        </a:solidFill>
+        <a:effectLst/>
+      </p:bgPr>
+    </p:bg>
+    <p:spTree>
+      <p:nvGrpSpPr>
+        <p:cNvPr id="1" name=""/>
+        <p:cNvGrpSpPr/>
+        <p:nvPr/>
+      </p:nvGrpSpPr>
+      <p:grpSpPr>
+        <a:xfrm>
+          <a:off x="0" y="0"/>
+          <a:ext cx="0" cy="0"/>
+          <a:chOff x="0" y="0"/>
+          <a:chExt cx="0" cy="0"/>
+        </a:xfrm>
+      </p:grpSpPr>
+      <p:sp useBgFill="1">
+        <p:nvSpPr>
+          <p:cNvPr id="8" name="Rectangle 7">
+            <a:extLst>
+              <a:ext uri="{FF2B5EF4-FFF2-40B4-BE49-F238E27FC236}">
+                <a16:creationId xmlns:a16="http://schemas.microsoft.com/office/drawing/2014/main" id="{100EDD19-6802-4EC3-95CE-CFFAB042CFD6}"/>
+              </a:ext>
+              <a:ext uri="{C183D7F6-B498-43B3-948B-1728B52AA6E4}">
+                <adec:decorative xmlns:adec="http://schemas.microsoft.com/office/drawing/2017/decorative" val="1"/>
+              </a:ext>
+            </a:extLst>
+          </p:cNvPr>
+          <p:cNvSpPr>
+            <a:spLocks noGrp="1" noRot="1" noChangeAspect="1" noMove="1" noResize="1" noEditPoints="1" noAdjustHandles="1" noChangeArrowheads="1" noChangeShapeType="1" noTextEdit="1"/>
+          </p:cNvSpPr>
+          <p:nvPr>
+            <p:extLst>
+              <p:ext uri="{386F3935-93C4-4BCD-93E2-E3B085C9AB24}">
+                <p16:designElem xmlns:p16="http://schemas.microsoft.com/office/powerpoint/2015/main" val="1"/>
+              </p:ext>
+            </p:extLst>
+          </p:nvPr>
+        </p:nvSpPr>
+        <p:spPr>
+          <a:xfrm>
+            <a:off x="0" y="0"/>
+            <a:ext cx="12188952" cy="6858000"/>
+          </a:xfrm>
+          <a:prstGeom prst="rect">
+            <a:avLst/>
+          </a:prstGeom>
+          <a:ln>
+            <a:noFill/>
+          </a:ln>
+        </p:spPr>
+        <p:style>
+          <a:lnRef idx="2">
+            <a:schemeClr val="accent1">
+              <a:shade val="50000"/>
+            </a:schemeClr>
+          </a:lnRef>
+          <a:fillRef idx="1">
+            <a:schemeClr val="accent1"/>
+          </a:fillRef>
+          <a:effectRef idx="0">
+            <a:schemeClr val="accent1"/>
+          </a:effectRef>
+          <a:fontRef idx="minor">
+            <a:schemeClr val="lt1"/>
+          </a:fontRef>
+        </p:style>
+        <p:txBody>
+          <a:bodyPr rtlCol="0" anchor="ctr"/>
+          <a:lstStyle/>
+          <a:p>
+            <a:pPr algn="ctr"/>
+            <a:endParaRPr lang="en-US"/>
+          </a:p>
+        </p:txBody>
+      </p:sp>
+      <p:sp>
+        <p:nvSpPr>
+          <p:cNvPr id="2" name="Title 1">
+            <a:extLst>
+              <a:ext uri="{FF2B5EF4-FFF2-40B4-BE49-F238E27FC236}">
+                <a16:creationId xmlns:a16="http://schemas.microsoft.com/office/drawing/2014/main" id="{D6C27C0B-841B-6B4C-A088-FD59521986B7}"/>
+              </a:ext>
+            </a:extLst>
+          </p:cNvPr>
+          <p:cNvSpPr>
+            <a:spLocks noGrp="1"/>
+          </p:cNvSpPr>
+          <p:nvPr>
+            <p:ph type="title"/>
+          </p:nvPr>
+        </p:nvSpPr>
+        <p:spPr>
+          <a:xfrm>
+            <a:off x="838200" y="365125"/>
+            <a:ext cx="10515600" cy="1325563"/>
+          </a:xfrm>
+        </p:spPr>
+        <p:txBody>
+          <a:bodyPr>
+            <a:normAutofit/>
+          </a:bodyPr>
+          <a:lstStyle/>
+          <a:p>
+            <a:r>
+              <a:rPr lang="ar-AE" sz="5400"/>
+              <a:t>المقدمة</a:t>
+            </a:r>
+            <a:endParaRPr lang="en-US" sz="5400"/>
+          </a:p>
+        </p:txBody>
+      </p:sp>
+      <p:sp>
+        <p:nvSpPr>
+          <p:cNvPr id="10" name="sketch line">
+            <a:extLst>
+              <a:ext uri="{FF2B5EF4-FFF2-40B4-BE49-F238E27FC236}">
+                <a16:creationId xmlns:a16="http://schemas.microsoft.com/office/drawing/2014/main" id="{DB17E863-922E-4C26-BD64-E8FD41D28661}"/>
+              </a:ext>
+              <a:ext uri="{C183D7F6-B498-43B3-948B-1728B52AA6E4}">
+                <adec:decorative xmlns:adec="http://schemas.microsoft.com/office/drawing/2017/decorative" val="1"/>
+              </a:ext>
+            </a:extLst>
+          </p:cNvPr>
+          <p:cNvSpPr>
+            <a:spLocks noGrp="1" noRot="1" noChangeAspect="1" noMove="1" noResize="1" noEditPoints="1" noAdjustHandles="1" noChangeArrowheads="1" noChangeShapeType="1" noTextEdit="1"/>
+          </p:cNvSpPr>
+          <p:nvPr>
+            <p:extLst>
+              <p:ext uri="{386F3935-93C4-4BCD-93E2-E3B085C9AB24}">
+                <p16:designElem xmlns:p16="http://schemas.microsoft.com/office/powerpoint/2015/main" val="1"/>
+              </p:ext>
+            </p:extLst>
+          </p:nvPr>
+        </p:nvSpPr>
+        <p:spPr>
+          <a:xfrm>
+            <a:off x="669036" y="1677373"/>
+            <a:ext cx="10853928" cy="18288"/>
+          </a:xfrm>
+          <a:custGeom>
+            <a:avLst/>
+            <a:gdLst>
+              <a:gd name="connsiteX0" fmla="*/ 0 w 10853928"/>
+              <a:gd name="connsiteY0" fmla="*/ 0 h 18288"/>
+              <a:gd name="connsiteX1" fmla="*/ 461292 w 10853928"/>
+              <a:gd name="connsiteY1" fmla="*/ 0 h 18288"/>
+              <a:gd name="connsiteX2" fmla="*/ 1139662 w 10853928"/>
+              <a:gd name="connsiteY2" fmla="*/ 0 h 18288"/>
+              <a:gd name="connsiteX3" fmla="*/ 1926572 w 10853928"/>
+              <a:gd name="connsiteY3" fmla="*/ 0 h 18288"/>
+              <a:gd name="connsiteX4" fmla="*/ 2279325 w 10853928"/>
+              <a:gd name="connsiteY4" fmla="*/ 0 h 18288"/>
+              <a:gd name="connsiteX5" fmla="*/ 2632078 w 10853928"/>
+              <a:gd name="connsiteY5" fmla="*/ 0 h 18288"/>
+              <a:gd name="connsiteX6" fmla="*/ 3527527 w 10853928"/>
+              <a:gd name="connsiteY6" fmla="*/ 0 h 18288"/>
+              <a:gd name="connsiteX7" fmla="*/ 4205897 w 10853928"/>
+              <a:gd name="connsiteY7" fmla="*/ 0 h 18288"/>
+              <a:gd name="connsiteX8" fmla="*/ 4558650 w 10853928"/>
+              <a:gd name="connsiteY8" fmla="*/ 0 h 18288"/>
+              <a:gd name="connsiteX9" fmla="*/ 5237020 w 10853928"/>
+              <a:gd name="connsiteY9" fmla="*/ 0 h 18288"/>
+              <a:gd name="connsiteX10" fmla="*/ 6132469 w 10853928"/>
+              <a:gd name="connsiteY10" fmla="*/ 0 h 18288"/>
+              <a:gd name="connsiteX11" fmla="*/ 6702301 w 10853928"/>
+              <a:gd name="connsiteY11" fmla="*/ 0 h 18288"/>
+              <a:gd name="connsiteX12" fmla="*/ 7272132 w 10853928"/>
+              <a:gd name="connsiteY12" fmla="*/ 0 h 18288"/>
+              <a:gd name="connsiteX13" fmla="*/ 7950502 w 10853928"/>
+              <a:gd name="connsiteY13" fmla="*/ 0 h 18288"/>
+              <a:gd name="connsiteX14" fmla="*/ 8737412 w 10853928"/>
+              <a:gd name="connsiteY14" fmla="*/ 0 h 18288"/>
+              <a:gd name="connsiteX15" fmla="*/ 9524322 w 10853928"/>
+              <a:gd name="connsiteY15" fmla="*/ 0 h 18288"/>
+              <a:gd name="connsiteX16" fmla="*/ 10853928 w 10853928"/>
+              <a:gd name="connsiteY16" fmla="*/ 0 h 18288"/>
+              <a:gd name="connsiteX17" fmla="*/ 10853928 w 10853928"/>
+              <a:gd name="connsiteY17" fmla="*/ 18288 h 18288"/>
+              <a:gd name="connsiteX18" fmla="*/ 10392636 w 10853928"/>
+              <a:gd name="connsiteY18" fmla="*/ 18288 h 18288"/>
+              <a:gd name="connsiteX19" fmla="*/ 9497187 w 10853928"/>
+              <a:gd name="connsiteY19" fmla="*/ 18288 h 18288"/>
+              <a:gd name="connsiteX20" fmla="*/ 8818817 w 10853928"/>
+              <a:gd name="connsiteY20" fmla="*/ 18288 h 18288"/>
+              <a:gd name="connsiteX21" fmla="*/ 8466064 w 10853928"/>
+              <a:gd name="connsiteY21" fmla="*/ 18288 h 18288"/>
+              <a:gd name="connsiteX22" fmla="*/ 7787693 w 10853928"/>
+              <a:gd name="connsiteY22" fmla="*/ 18288 h 18288"/>
+              <a:gd name="connsiteX23" fmla="*/ 7217862 w 10853928"/>
+              <a:gd name="connsiteY23" fmla="*/ 18288 h 18288"/>
+              <a:gd name="connsiteX24" fmla="*/ 6648031 w 10853928"/>
+              <a:gd name="connsiteY24" fmla="*/ 18288 h 18288"/>
+              <a:gd name="connsiteX25" fmla="*/ 6078200 w 10853928"/>
+              <a:gd name="connsiteY25" fmla="*/ 18288 h 18288"/>
+              <a:gd name="connsiteX26" fmla="*/ 5508368 w 10853928"/>
+              <a:gd name="connsiteY26" fmla="*/ 18288 h 18288"/>
+              <a:gd name="connsiteX27" fmla="*/ 4721459 w 10853928"/>
+              <a:gd name="connsiteY27" fmla="*/ 18288 h 18288"/>
+              <a:gd name="connsiteX28" fmla="*/ 4043088 w 10853928"/>
+              <a:gd name="connsiteY28" fmla="*/ 18288 h 18288"/>
+              <a:gd name="connsiteX29" fmla="*/ 3690336 w 10853928"/>
+              <a:gd name="connsiteY29" fmla="*/ 18288 h 18288"/>
+              <a:gd name="connsiteX30" fmla="*/ 3120504 w 10853928"/>
+              <a:gd name="connsiteY30" fmla="*/ 18288 h 18288"/>
+              <a:gd name="connsiteX31" fmla="*/ 2333595 w 10853928"/>
+              <a:gd name="connsiteY31" fmla="*/ 18288 h 18288"/>
+              <a:gd name="connsiteX32" fmla="*/ 1872303 w 10853928"/>
+              <a:gd name="connsiteY32" fmla="*/ 18288 h 18288"/>
+              <a:gd name="connsiteX33" fmla="*/ 976854 w 10853928"/>
+              <a:gd name="connsiteY33" fmla="*/ 18288 h 18288"/>
+              <a:gd name="connsiteX34" fmla="*/ 0 w 10853928"/>
+              <a:gd name="connsiteY34" fmla="*/ 18288 h 18288"/>
+              <a:gd name="connsiteX35" fmla="*/ 0 w 10853928"/>
+              <a:gd name="connsiteY35" fmla="*/ 0 h 18288"/>
+            </a:gdLst>
+            <a:ahLst/>
+            <a:cxnLst>
+              <a:cxn ang="0">
+                <a:pos x="connsiteX0" y="connsiteY0"/>
+              </a:cxn>
+              <a:cxn ang="0">
+                <a:pos x="connsiteX1" y="connsiteY1"/>
+              </a:cxn>
+              <a:cxn ang="0">
+                <a:pos x="connsiteX2" y="connsiteY2"/>
+              </a:cxn>
+              <a:cxn ang="0">
+                <a:pos x="connsiteX3" y="connsiteY3"/>
+              </a:cxn>
+              <a:cxn ang="0">
+                <a:pos x="connsiteX4" y="connsiteY4"/>
+              </a:cxn>
+              <a:cxn ang="0">
+                <a:pos x="connsiteX5" y="connsiteY5"/>
+              </a:cxn>
+              <a:cxn ang="0">
+                <a:pos x="connsiteX6" y="connsiteY6"/>
+              </a:cxn>
+              <a:cxn ang="0">
+                <a:pos x="connsiteX7" y="connsiteY7"/>
+              </a:cxn>
+              <a:cxn ang="0">
+                <a:pos x="connsiteX8" y="connsiteY8"/>
+              </a:cxn>
+              <a:cxn ang="0">
+                <a:pos x="connsiteX9" y="connsiteY9"/>
+              </a:cxn>
+              <a:cxn ang="0">
+                <a:pos x="connsiteX10" y="connsiteY10"/>
+              </a:cxn>
+              <a:cxn ang="0">
+                <a:pos x="connsiteX11" y="connsiteY11"/>
+              </a:cxn>
+              <a:cxn ang="0">
+                <a:pos x="connsiteX12" y="connsiteY12"/>
+              </a:cxn>
+              <a:cxn ang="0">
+                <a:pos x="connsiteX13" y="connsiteY13"/>
+              </a:cxn>
+              <a:cxn ang="0">
+                <a:pos x="connsiteX14" y="connsiteY14"/>
+              </a:cxn>
+              <a:cxn ang="0">
+                <a:pos x="connsiteX15" y="connsiteY15"/>
+              </a:cxn>
+              <a:cxn ang="0">
+                <a:pos x="connsiteX16" y="connsiteY16"/>
+              </a:cxn>
+              <a:cxn ang="0">
+                <a:pos x="connsiteX17" y="connsiteY17"/>
+              </a:cxn>
+              <a:cxn ang="0">
+                <a:pos x="connsiteX18" y="connsiteY18"/>
+              </a:cxn>
+              <a:cxn ang="0">
+                <a:pos x="connsiteX19" y="connsiteY19"/>
+              </a:cxn>
+              <a:cxn ang="0">
+                <a:pos x="connsiteX20" y="connsiteY20"/>
+              </a:cxn>
+              <a:cxn ang="0">
+                <a:pos x="connsiteX21" y="connsiteY21"/>
+              </a:cxn>
+              <a:cxn ang="0">
+                <a:pos x="connsiteX22" y="connsiteY22"/>
+              </a:cxn>
+              <a:cxn ang="0">
+                <a:pos x="connsiteX23" y="connsiteY23"/>
+              </a:cxn>
+              <a:cxn ang="0">
+                <a:pos x="connsiteX24" y="connsiteY24"/>
+              </a:cxn>
+              <a:cxn ang="0">
+                <a:pos x="connsiteX25" y="connsiteY25"/>
+              </a:cxn>
+              <a:cxn ang="0">
+                <a:pos x="connsiteX26" y="connsiteY26"/>
+              </a:cxn>
+              <a:cxn ang="0">
+                <a:pos x="connsiteX27" y="connsiteY27"/>
+              </a:cxn>
+              <a:cxn ang="0">
+                <a:pos x="connsiteX28" y="connsiteY28"/>
+              </a:cxn>
+              <a:cxn ang="0">
+                <a:pos x="connsiteX29" y="connsiteY29"/>
+              </a:cxn>
+              <a:cxn ang="0">
+                <a:pos x="connsiteX30" y="connsiteY30"/>
+              </a:cxn>
+              <a:cxn ang="0">
+                <a:pos x="connsiteX31" y="connsiteY31"/>
+              </a:cxn>
+              <a:cxn ang="0">
+                <a:pos x="connsiteX32" y="connsiteY32"/>
+              </a:cxn>
+              <a:cxn ang="0">
+                <a:pos x="connsiteX33" y="connsiteY33"/>
+              </a:cxn>
+              <a:cxn ang="0">
+                <a:pos x="connsiteX34" y="connsiteY34"/>
+              </a:cxn>
+              <a:cxn ang="0">
+                <a:pos x="connsiteX35" y="connsiteY35"/>
+              </a:cxn>
+            </a:cxnLst>
+            <a:rect l="l" t="t" r="r" b="b"/>
+            <a:pathLst>
+              <a:path w="10853928" h="18288" fill="none" extrusionOk="0">
+                <a:moveTo>
+                  <a:pt x="0" y="0"/>
+                </a:moveTo>
+                <a:cubicBezTo>
+                  <a:pt x="146993" y="-19076"/>
+                  <a:pt x="347684" y="-4790"/>
+                  <a:pt x="461292" y="0"/>
+                </a:cubicBezTo>
+                <a:cubicBezTo>
+                  <a:pt x="574900" y="4790"/>
+                  <a:pt x="808367" y="19821"/>
+                  <a:pt x="1139662" y="0"/>
+                </a:cubicBezTo>
+                <a:cubicBezTo>
+                  <a:pt x="1470957" y="-19821"/>
+                  <a:pt x="1627405" y="5721"/>
+                  <a:pt x="1926572" y="0"/>
+                </a:cubicBezTo>
+                <a:cubicBezTo>
+                  <a:pt x="2225739" y="-5721"/>
+                  <a:pt x="2137730" y="-3235"/>
+                  <a:pt x="2279325" y="0"/>
+                </a:cubicBezTo>
+                <a:cubicBezTo>
+                  <a:pt x="2420920" y="3235"/>
+                  <a:pt x="2456518" y="9685"/>
+                  <a:pt x="2632078" y="0"/>
+                </a:cubicBezTo>
+                <a:cubicBezTo>
+                  <a:pt x="2807638" y="-9685"/>
+                  <a:pt x="3211516" y="-43007"/>
+                  <a:pt x="3527527" y="0"/>
+                </a:cubicBezTo>
+                <a:cubicBezTo>
+                  <a:pt x="3843538" y="43007"/>
+                  <a:pt x="4058833" y="22042"/>
+                  <a:pt x="4205897" y="0"/>
+                </a:cubicBezTo>
+                <a:cubicBezTo>
+                  <a:pt x="4352961" y="-22042"/>
+                  <a:pt x="4474805" y="-11846"/>
+                  <a:pt x="4558650" y="0"/>
+                </a:cubicBezTo>
+                <a:cubicBezTo>
+                  <a:pt x="4642495" y="11846"/>
+                  <a:pt x="5041928" y="-6069"/>
+                  <a:pt x="5237020" y="0"/>
+                </a:cubicBezTo>
+                <a:cubicBezTo>
+                  <a:pt x="5432112" y="6069"/>
+                  <a:pt x="5943266" y="-17479"/>
+                  <a:pt x="6132469" y="0"/>
+                </a:cubicBezTo>
+                <a:cubicBezTo>
+                  <a:pt x="6321672" y="17479"/>
+                  <a:pt x="6483872" y="26234"/>
+                  <a:pt x="6702301" y="0"/>
+                </a:cubicBezTo>
+                <a:cubicBezTo>
+                  <a:pt x="6920730" y="-26234"/>
+                  <a:pt x="6991194" y="-15156"/>
+                  <a:pt x="7272132" y="0"/>
+                </a:cubicBezTo>
+                <a:cubicBezTo>
+                  <a:pt x="7553070" y="15156"/>
+                  <a:pt x="7684444" y="-32961"/>
+                  <a:pt x="7950502" y="0"/>
+                </a:cubicBezTo>
+                <a:cubicBezTo>
+                  <a:pt x="8216560" y="32961"/>
+                  <a:pt x="8493290" y="-10491"/>
+                  <a:pt x="8737412" y="0"/>
+                </a:cubicBezTo>
+                <a:cubicBezTo>
+                  <a:pt x="8981534" y="10491"/>
+                  <a:pt x="9191586" y="-13899"/>
+                  <a:pt x="9524322" y="0"/>
+                </a:cubicBezTo>
+                <a:cubicBezTo>
+                  <a:pt x="9857058" y="13899"/>
+                  <a:pt x="10297509" y="7485"/>
+                  <a:pt x="10853928" y="0"/>
+                </a:cubicBezTo>
+                <a:cubicBezTo>
+                  <a:pt x="10854574" y="4451"/>
+                  <a:pt x="10854418" y="9226"/>
+                  <a:pt x="10853928" y="18288"/>
+                </a:cubicBezTo>
+                <a:cubicBezTo>
+                  <a:pt x="10691638" y="28522"/>
+                  <a:pt x="10574319" y="29578"/>
+                  <a:pt x="10392636" y="18288"/>
+                </a:cubicBezTo>
+                <a:cubicBezTo>
+                  <a:pt x="10210953" y="6998"/>
+                  <a:pt x="9836277" y="-16742"/>
+                  <a:pt x="9497187" y="18288"/>
+                </a:cubicBezTo>
+                <a:cubicBezTo>
+                  <a:pt x="9158097" y="53318"/>
+                  <a:pt x="9119479" y="30714"/>
+                  <a:pt x="8818817" y="18288"/>
+                </a:cubicBezTo>
+                <a:cubicBezTo>
+                  <a:pt x="8518155" y="5863"/>
+                  <a:pt x="8640037" y="6483"/>
+                  <a:pt x="8466064" y="18288"/>
+                </a:cubicBezTo>
+                <a:cubicBezTo>
+                  <a:pt x="8292091" y="30093"/>
+                  <a:pt x="7997656" y="18914"/>
+                  <a:pt x="7787693" y="18288"/>
+                </a:cubicBezTo>
+                <a:cubicBezTo>
+                  <a:pt x="7577730" y="17662"/>
+                  <a:pt x="7412468" y="21416"/>
+                  <a:pt x="7217862" y="18288"/>
+                </a:cubicBezTo>
+                <a:cubicBezTo>
+                  <a:pt x="7023256" y="15160"/>
+                  <a:pt x="6898018" y="14824"/>
+                  <a:pt x="6648031" y="18288"/>
+                </a:cubicBezTo>
+                <a:cubicBezTo>
+                  <a:pt x="6398044" y="21752"/>
+                  <a:pt x="6254402" y="38625"/>
+                  <a:pt x="6078200" y="18288"/>
+                </a:cubicBezTo>
+                <a:cubicBezTo>
+                  <a:pt x="5901998" y="-2049"/>
+                  <a:pt x="5622886" y="3213"/>
+                  <a:pt x="5508368" y="18288"/>
+                </a:cubicBezTo>
+                <a:cubicBezTo>
+                  <a:pt x="5393850" y="33363"/>
+                  <a:pt x="5036260" y="26830"/>
+                  <a:pt x="4721459" y="18288"/>
+                </a:cubicBezTo>
+                <a:cubicBezTo>
+                  <a:pt x="4406658" y="9746"/>
+                  <a:pt x="4239221" y="41551"/>
+                  <a:pt x="4043088" y="18288"/>
+                </a:cubicBezTo>
+                <a:cubicBezTo>
+                  <a:pt x="3846955" y="-4975"/>
+                  <a:pt x="3818802" y="34658"/>
+                  <a:pt x="3690336" y="18288"/>
+                </a:cubicBezTo>
+                <a:cubicBezTo>
+                  <a:pt x="3561870" y="1918"/>
+                  <a:pt x="3265491" y="42194"/>
+                  <a:pt x="3120504" y="18288"/>
+                </a:cubicBezTo>
+                <a:cubicBezTo>
+                  <a:pt x="2975517" y="-5618"/>
+                  <a:pt x="2720254" y="36673"/>
+                  <a:pt x="2333595" y="18288"/>
+                </a:cubicBezTo>
+                <a:cubicBezTo>
+                  <a:pt x="1946936" y="-97"/>
+                  <a:pt x="2097241" y="5776"/>
+                  <a:pt x="1872303" y="18288"/>
+                </a:cubicBezTo>
+                <a:cubicBezTo>
+                  <a:pt x="1647365" y="30800"/>
+                  <a:pt x="1282708" y="45380"/>
+                  <a:pt x="976854" y="18288"/>
+                </a:cubicBezTo>
+                <a:cubicBezTo>
+                  <a:pt x="671000" y="-8804"/>
+                  <a:pt x="408401" y="-12775"/>
+                  <a:pt x="0" y="18288"/>
+                </a:cubicBezTo>
+                <a:cubicBezTo>
+                  <a:pt x="-213" y="9468"/>
+                  <a:pt x="187" y="4459"/>
+                  <a:pt x="0" y="0"/>
+                </a:cubicBezTo>
+                <a:close/>
+              </a:path>
+              <a:path w="10853928" h="18288" stroke="0" extrusionOk="0">
+                <a:moveTo>
+                  <a:pt x="0" y="0"/>
+                </a:moveTo>
+                <a:cubicBezTo>
+                  <a:pt x="267322" y="15284"/>
+                  <a:pt x="415388" y="-21048"/>
+                  <a:pt x="569831" y="0"/>
+                </a:cubicBezTo>
+                <a:cubicBezTo>
+                  <a:pt x="724274" y="21048"/>
+                  <a:pt x="769333" y="-2353"/>
+                  <a:pt x="922584" y="0"/>
+                </a:cubicBezTo>
+                <a:cubicBezTo>
+                  <a:pt x="1075835" y="2353"/>
+                  <a:pt x="1399490" y="-145"/>
+                  <a:pt x="1818033" y="0"/>
+                </a:cubicBezTo>
+                <a:cubicBezTo>
+                  <a:pt x="2236576" y="145"/>
+                  <a:pt x="2145330" y="5482"/>
+                  <a:pt x="2387864" y="0"/>
+                </a:cubicBezTo>
+                <a:cubicBezTo>
+                  <a:pt x="2630398" y="-5482"/>
+                  <a:pt x="2793207" y="18487"/>
+                  <a:pt x="2957695" y="0"/>
+                </a:cubicBezTo>
+                <a:cubicBezTo>
+                  <a:pt x="3122183" y="-18487"/>
+                  <a:pt x="3579141" y="19003"/>
+                  <a:pt x="3853144" y="0"/>
+                </a:cubicBezTo>
+                <a:cubicBezTo>
+                  <a:pt x="4127147" y="-19003"/>
+                  <a:pt x="4209857" y="12211"/>
+                  <a:pt x="4314436" y="0"/>
+                </a:cubicBezTo>
+                <a:cubicBezTo>
+                  <a:pt x="4419015" y="-12211"/>
+                  <a:pt x="4762459" y="-17220"/>
+                  <a:pt x="5209885" y="0"/>
+                </a:cubicBezTo>
+                <a:cubicBezTo>
+                  <a:pt x="5657311" y="17220"/>
+                  <a:pt x="5692663" y="-3290"/>
+                  <a:pt x="6105335" y="0"/>
+                </a:cubicBezTo>
+                <a:cubicBezTo>
+                  <a:pt x="6518007" y="3290"/>
+                  <a:pt x="6455516" y="-5124"/>
+                  <a:pt x="6783705" y="0"/>
+                </a:cubicBezTo>
+                <a:cubicBezTo>
+                  <a:pt x="7111894" y="5124"/>
+                  <a:pt x="7441941" y="-17829"/>
+                  <a:pt x="7679154" y="0"/>
+                </a:cubicBezTo>
+                <a:cubicBezTo>
+                  <a:pt x="7916367" y="17829"/>
+                  <a:pt x="8102967" y="-24363"/>
+                  <a:pt x="8248985" y="0"/>
+                </a:cubicBezTo>
+                <a:cubicBezTo>
+                  <a:pt x="8395003" y="24363"/>
+                  <a:pt x="8552393" y="25505"/>
+                  <a:pt x="8818817" y="0"/>
+                </a:cubicBezTo>
+                <a:cubicBezTo>
+                  <a:pt x="9085241" y="-25505"/>
+                  <a:pt x="9411308" y="38000"/>
+                  <a:pt x="9605726" y="0"/>
+                </a:cubicBezTo>
+                <a:cubicBezTo>
+                  <a:pt x="9800144" y="-38000"/>
+                  <a:pt x="10006468" y="-25741"/>
+                  <a:pt x="10175558" y="0"/>
+                </a:cubicBezTo>
+                <a:cubicBezTo>
+                  <a:pt x="10344648" y="25741"/>
+                  <a:pt x="10696282" y="695"/>
+                  <a:pt x="10853928" y="0"/>
+                </a:cubicBezTo>
+                <a:cubicBezTo>
+                  <a:pt x="10853521" y="8690"/>
+                  <a:pt x="10853774" y="14141"/>
+                  <a:pt x="10853928" y="18288"/>
+                </a:cubicBezTo>
+                <a:cubicBezTo>
+                  <a:pt x="10608124" y="24255"/>
+                  <a:pt x="10343415" y="22307"/>
+                  <a:pt x="10067018" y="18288"/>
+                </a:cubicBezTo>
+                <a:cubicBezTo>
+                  <a:pt x="9790621" y="14270"/>
+                  <a:pt x="9843266" y="3564"/>
+                  <a:pt x="9714266" y="18288"/>
+                </a:cubicBezTo>
+                <a:cubicBezTo>
+                  <a:pt x="9585266" y="33012"/>
+                  <a:pt x="9379484" y="1875"/>
+                  <a:pt x="9252974" y="18288"/>
+                </a:cubicBezTo>
+                <a:cubicBezTo>
+                  <a:pt x="9126464" y="34701"/>
+                  <a:pt x="8580678" y="-4904"/>
+                  <a:pt x="8357525" y="18288"/>
+                </a:cubicBezTo>
+                <a:cubicBezTo>
+                  <a:pt x="8134372" y="41480"/>
+                  <a:pt x="7903199" y="26458"/>
+                  <a:pt x="7679154" y="18288"/>
+                </a:cubicBezTo>
+                <a:cubicBezTo>
+                  <a:pt x="7455109" y="10118"/>
+                  <a:pt x="7435944" y="27109"/>
+                  <a:pt x="7217862" y="18288"/>
+                </a:cubicBezTo>
+                <a:cubicBezTo>
+                  <a:pt x="6999780" y="9467"/>
+                  <a:pt x="6680409" y="18985"/>
+                  <a:pt x="6539492" y="18288"/>
+                </a:cubicBezTo>
+                <a:cubicBezTo>
+                  <a:pt x="6398575" y="17592"/>
+                  <a:pt x="6312077" y="33018"/>
+                  <a:pt x="6186739" y="18288"/>
+                </a:cubicBezTo>
+                <a:cubicBezTo>
+                  <a:pt x="6061401" y="3558"/>
+                  <a:pt x="5947033" y="12075"/>
+                  <a:pt x="5833986" y="18288"/>
+                </a:cubicBezTo>
+                <a:cubicBezTo>
+                  <a:pt x="5720939" y="24501"/>
+                  <a:pt x="5482226" y="8586"/>
+                  <a:pt x="5155616" y="18288"/>
+                </a:cubicBezTo>
+                <a:cubicBezTo>
+                  <a:pt x="4829006" y="27991"/>
+                  <a:pt x="4841274" y="29316"/>
+                  <a:pt x="4694324" y="18288"/>
+                </a:cubicBezTo>
+                <a:cubicBezTo>
+                  <a:pt x="4547374" y="7260"/>
+                  <a:pt x="4077675" y="7013"/>
+                  <a:pt x="3907414" y="18288"/>
+                </a:cubicBezTo>
+                <a:cubicBezTo>
+                  <a:pt x="3737153" y="29564"/>
+                  <a:pt x="3538393" y="21630"/>
+                  <a:pt x="3446122" y="18288"/>
+                </a:cubicBezTo>
+                <a:cubicBezTo>
+                  <a:pt x="3353851" y="14946"/>
+                  <a:pt x="2990320" y="-8091"/>
+                  <a:pt x="2659212" y="18288"/>
+                </a:cubicBezTo>
+                <a:cubicBezTo>
+                  <a:pt x="2328104" y="44667"/>
+                  <a:pt x="2427653" y="9607"/>
+                  <a:pt x="2306460" y="18288"/>
+                </a:cubicBezTo>
+                <a:cubicBezTo>
+                  <a:pt x="2185267" y="26969"/>
+                  <a:pt x="1719763" y="3717"/>
+                  <a:pt x="1519550" y="18288"/>
+                </a:cubicBezTo>
+                <a:cubicBezTo>
+                  <a:pt x="1319337" y="32860"/>
+                  <a:pt x="1167371" y="17040"/>
+                  <a:pt x="1058258" y="18288"/>
+                </a:cubicBezTo>
+                <a:cubicBezTo>
+                  <a:pt x="949145" y="19536"/>
+                  <a:pt x="780234" y="31447"/>
+                  <a:pt x="705505" y="18288"/>
+                </a:cubicBezTo>
+                <a:cubicBezTo>
+                  <a:pt x="630776" y="5129"/>
+                  <a:pt x="215796" y="30056"/>
+                  <a:pt x="0" y="18288"/>
+                </a:cubicBezTo>
+                <a:cubicBezTo>
+                  <a:pt x="-53" y="11301"/>
+                  <a:pt x="-649" y="7756"/>
+                  <a:pt x="0" y="0"/>
+                </a:cubicBezTo>
+                <a:close/>
+              </a:path>
+            </a:pathLst>
+          </a:custGeom>
+          <a:solidFill>
+            <a:schemeClr val="accent2"/>
+          </a:solidFill>
+          <a:ln w="41275" cap="rnd">
+            <a:solidFill>
+              <a:schemeClr val="accent2"/>
+            </a:solidFill>
+            <a:round/>
+            <a:extLst>
+              <a:ext uri="{C807C97D-BFC1-408E-A445-0C87EB9F89A2}">
+                <ask:lineSketchStyleProps xmlns:ask="http://schemas.microsoft.com/office/drawing/2018/sketchyshapes" sd="1219033472">
+                  <a:prstGeom prst="rect">
+                    <a:avLst/>
+                  </a:prstGeom>
+                  <ask:type>
+                    <ask:lineSketchFreehand/>
+                  </ask:type>
+                </ask:lineSketchStyleProps>
+              </a:ext>
+            </a:extLst>
+          </a:ln>
+        </p:spPr>
+        <p:style>
+          <a:lnRef idx="2">
+            <a:schemeClr val="accent1">
+              <a:shade val="50000"/>
+            </a:schemeClr>
+          </a:lnRef>
+          <a:fillRef idx="1">
+            <a:schemeClr val="accent1"/>
+          </a:fillRef>
+          <a:effectRef idx="0">
+            <a:schemeClr val="accent1"/>
+          </a:effectRef>
+          <a:fontRef idx="minor">
+            <a:schemeClr val="lt1"/>
+          </a:fontRef>
+        </p:style>
+        <p:txBody>
+          <a:bodyPr rtlCol="0" anchor="ctr"/>
+          <a:lstStyle/>
+          <a:p>
+            <a:pPr algn="ctr"/>
+            <a:endParaRPr lang="en-US"/>
+          </a:p>
+        </p:txBody>
+      </p:sp>
+      <p:sp>
+        <p:nvSpPr>
+          <p:cNvPr id="3" name="Content Placeholder 2">
+            <a:extLst>
+              <a:ext uri="{FF2B5EF4-FFF2-40B4-BE49-F238E27FC236}">
+                <a16:creationId xmlns:a16="http://schemas.microsoft.com/office/drawing/2014/main" id="{DAE71DB3-7DFA-0144-B4BA-1E1A485C7D4C}"/>
+              </a:ext>
+            </a:extLst>
+          </p:cNvPr>
+          <p:cNvSpPr>
+            <a:spLocks noGrp="1"/>
+          </p:cNvSpPr>
+          <p:nvPr>
+            <p:ph idx="1"/>
+          </p:nvPr>
+        </p:nvSpPr>
+        <p:spPr>
+          <a:xfrm>
+            <a:off x="838200" y="1929384"/>
+            <a:ext cx="10515600" cy="4251960"/>
+          </a:xfrm>
+        </p:spPr>
+        <p:txBody>
+          <a:bodyPr>
+            <a:normAutofit/>
+          </a:bodyPr>
+          <a:lstStyle/>
+          <a:p>
+            <a:pPr marL="0" indent="0">
+              <a:buNone/>
+            </a:pPr>
+            <a:r>
+              <a:rPr lang="ar-AE" sz="2200"/>
+              <a:t>مهمة استطلاع البنية التحتية (الشبكة) من اول واهم المهام التي تساعد على فهم ومعرفة البيئة (منطقة العمليات) التي سوف يعمل بها فريق المهام، ولتسهيل عمل فريق الاستطلاع للقيام بأعماله ولضمان النتائج المرجوة، قام فريق التطوير والدعم الفني ببناء أداة استطلاع بنية تحتية لفحص الشبكة وجمع المعلومات ونقاط الضعف فيها ليتم بناء ادوات الاستغلال من قبلنا واستخدام هذه الادوات من قبل فريق المهام.</a:t>
+            </a:r>
+            <a:endParaRPr lang="en-US" sz="2200"/>
+          </a:p>
+        </p:txBody>
+      </p:sp>
+    </p:spTree>
+    <p:extLst>
+      <p:ext uri="{BB962C8B-B14F-4D97-AF65-F5344CB8AC3E}">
+        <p14:creationId xmlns:p14="http://schemas.microsoft.com/office/powerpoint/2010/main" val="1027436458"/>
+      </p:ext>
+    </p:extLst>
+  </p:cSld>
+  <p:clrMapOvr>
+    <a:masterClrMapping/>
+  </p:clrMapOvr>
+</p:sld>
+</file>
+
+<file path=ppt/slides/slide3.xml><?xml version="1.0" encoding="utf-8"?>
+<p:sld xmlns:a="http://schemas.openxmlformats.org/drawingml/2006/main" xmlns:r="http://schemas.openxmlformats.org/officeDocument/2006/relationships" xmlns:p="http://schemas.openxmlformats.org/presentationml/2006/main">
+  <p:cSld>
+    <p:spTree>
+      <p:nvGrpSpPr>
+        <p:cNvPr id="1" name=""/>
+        <p:cNvGrpSpPr/>
+        <p:nvPr/>
+      </p:nvGrpSpPr>
+      <p:grpSpPr>
+        <a:xfrm>
+          <a:off x="0" y="0"/>
+          <a:ext cx="0" cy="0"/>
+          <a:chOff x="0" y="0"/>
+          <a:chExt cx="0" cy="0"/>
+        </a:xfrm>
+      </p:grpSpPr>
+      <p:sp>
+        <p:nvSpPr>
+          <p:cNvPr id="2" name="Title 1">
+            <a:extLst>
+              <a:ext uri="{FF2B5EF4-FFF2-40B4-BE49-F238E27FC236}">
+                <a16:creationId xmlns:a16="http://schemas.microsoft.com/office/drawing/2014/main" id="{3D1FDDDB-920A-1144-9B31-FB932661746F}"/>
+              </a:ext>
+            </a:extLst>
+          </p:cNvPr>
+          <p:cNvSpPr>
+            <a:spLocks noGrp="1"/>
+          </p:cNvSpPr>
+          <p:nvPr>
+            <p:ph type="title"/>
+          </p:nvPr>
+        </p:nvSpPr>
+        <p:spPr/>
+        <p:txBody>
+          <a:bodyPr/>
+          <a:lstStyle/>
+          <a:p>
+            <a:pPr algn="r"/>
+            <a:r>
+              <a:rPr lang="ar-SA"/>
+              <a:t>المهمة</a:t>
+            </a:r>
+            <a:endParaRPr lang="ar-SA" dirty="0"/>
+          </a:p>
+        </p:txBody>
+      </p:sp>
+      <p:graphicFrame>
+        <p:nvGraphicFramePr>
+          <p:cNvPr id="12" name="Content Placeholder 2">
+            <a:extLst>
+              <a:ext uri="{FF2B5EF4-FFF2-40B4-BE49-F238E27FC236}">
+                <a16:creationId xmlns:a16="http://schemas.microsoft.com/office/drawing/2014/main" id="{A4E8FD15-37C8-1D02-A2CF-528EE859F2E8}"/>
+              </a:ext>
+            </a:extLst>
+          </p:cNvPr>
+          <p:cNvGraphicFramePr>
+            <a:graphicFrameLocks noGrp="1"/>
+          </p:cNvGraphicFramePr>
+          <p:nvPr>
+            <p:ph idx="1"/>
+            <p:extLst>
+              <p:ext uri="{D42A27DB-BD31-4B8C-83A1-F6EECF244321}">
+                <p14:modId xmlns:p14="http://schemas.microsoft.com/office/powerpoint/2010/main" val="1447797471"/>
+              </p:ext>
+            </p:extLst>
+          </p:nvPr>
+        </p:nvGraphicFramePr>
+        <p:xfrm>
+          <a:off x="838200" y="1825625"/>
+          <a:ext cx="10515600" cy="4351338"/>
+        </p:xfrm>
+        <a:graphic>
+          <a:graphicData uri="http://schemas.openxmlformats.org/drawingml/2006/diagram">
+            <dgm:relIds xmlns:dgm="http://schemas.openxmlformats.org/drawingml/2006/diagram" xmlns:r="http://schemas.openxmlformats.org/officeDocument/2006/relationships" r:dm="rId2" r:lo="rId3" r:qs="rId4" r:cs="rId5"/>
+          </a:graphicData>
+        </a:graphic>
+      </p:graphicFrame>
+    </p:spTree>
+    <p:extLst>
+      <p:ext uri="{BB962C8B-B14F-4D97-AF65-F5344CB8AC3E}">
+        <p14:creationId xmlns:p14="http://schemas.microsoft.com/office/powerpoint/2010/main" val="4240163905"/>
+      </p:ext>
+    </p:extLst>
+  </p:cSld>
+  <p:clrMapOvr>
+    <a:masterClrMapping/>
+  </p:clrMapOvr>
+</p:sld>
+</file>
+
+<file path=ppt/slides/slide4.xml><?xml version="1.0" encoding="utf-8"?>
+<p:sld xmlns:a="http://schemas.openxmlformats.org/drawingml/2006/main" xmlns:r="http://schemas.openxmlformats.org/officeDocument/2006/relationships" xmlns:p="http://schemas.openxmlformats.org/presentationml/2006/main">
+  <p:cSld>
+    <p:bg>
+      <p:bgPr>
+        <a:solidFill>
+          <a:schemeClr val="bg1"/>
+        </a:solidFill>
+        <a:effectLst/>
+      </p:bgPr>
+    </p:bg>
+    <p:spTree>
+      <p:nvGrpSpPr>
+        <p:cNvPr id="1" name=""/>
+        <p:cNvGrpSpPr/>
+        <p:nvPr/>
+      </p:nvGrpSpPr>
+      <p:grpSpPr>
+        <a:xfrm>
+          <a:off x="0" y="0"/>
+          <a:ext cx="0" cy="0"/>
+          <a:chOff x="0" y="0"/>
+          <a:chExt cx="0" cy="0"/>
+        </a:xfrm>
+      </p:grpSpPr>
+      <p:sp useBgFill="1">
+        <p:nvSpPr>
+          <p:cNvPr id="8" name="Rectangle 7">
+            <a:extLst>
+              <a:ext uri="{FF2B5EF4-FFF2-40B4-BE49-F238E27FC236}">
+                <a16:creationId xmlns:a16="http://schemas.microsoft.com/office/drawing/2014/main" id="{1B15ED52-F352-441B-82BF-E0EA34836D08}"/>
+              </a:ext>
+              <a:ext uri="{C183D7F6-B498-43B3-948B-1728B52AA6E4}">
+                <adec:decorative xmlns:adec="http://schemas.microsoft.com/office/drawing/2017/decorative" val="1"/>
+              </a:ext>
+            </a:extLst>
+          </p:cNvPr>
+          <p:cNvSpPr>
+            <a:spLocks noGrp="1" noRot="1" noChangeAspect="1" noMove="1" noResize="1" noEditPoints="1" noAdjustHandles="1" noChangeArrowheads="1" noChangeShapeType="1" noTextEdit="1"/>
+          </p:cNvSpPr>
+          <p:nvPr>
+            <p:extLst>
+              <p:ext uri="{386F3935-93C4-4BCD-93E2-E3B085C9AB24}">
+                <p16:designElem xmlns:p16="http://schemas.microsoft.com/office/powerpoint/2015/main" val="1"/>
+              </p:ext>
+            </p:extLst>
+          </p:nvPr>
+        </p:nvSpPr>
+        <p:spPr>
+          <a:xfrm>
+            <a:off x="0" y="0"/>
+            <a:ext cx="12192000" cy="6858000"/>
+          </a:xfrm>
+          <a:prstGeom prst="rect">
+            <a:avLst/>
+          </a:prstGeom>
+          <a:ln w="12700" cap="flat" cmpd="sng" algn="ctr">
+            <a:noFill/>
+            <a:prstDash val="solid"/>
+            <a:miter lim="800000"/>
+          </a:ln>
+          <a:effectLst/>
+          <a:extLst>
+            <a:ext uri="{91240B29-F687-4F45-9708-019B960494DF}">
+              <a14:hiddenLine xmlns:a14="http://schemas.microsoft.com/office/drawing/2010/main" w="12700" cap="flat" cmpd="sng" algn="ctr">
+                <a:solidFill>
+                  <a:schemeClr val="accent1">
+                    <a:shade val="50000"/>
+                  </a:schemeClr>
+                </a:solidFill>
+                <a:prstDash val="solid"/>
+                <a:miter lim="800000"/>
+              </a14:hiddenLine>
+            </a:ext>
+          </a:extLst>
+        </p:spPr>
+        <p:style>
+          <a:lnRef idx="2">
+            <a:schemeClr val="accent1">
+              <a:shade val="50000"/>
+            </a:schemeClr>
+          </a:lnRef>
+          <a:fillRef idx="1">
+            <a:schemeClr val="accent1"/>
+          </a:fillRef>
+          <a:effectRef idx="0">
+            <a:schemeClr val="accent1"/>
+          </a:effectRef>
+          <a:fontRef idx="minor">
+            <a:schemeClr val="lt1"/>
+          </a:fontRef>
+        </p:style>
+        <p:txBody>
+          <a:bodyPr rtlCol="0" anchor="ctr"/>
+          <a:lstStyle/>
+          <a:p>
+            <a:pPr algn="ctr"/>
+            <a:endParaRPr lang="en-US"/>
+          </a:p>
+        </p:txBody>
+      </p:sp>
+      <p:sp>
+        <p:nvSpPr>
+          <p:cNvPr id="10" name="Rectangle 9">
+            <a:extLst>
+              <a:ext uri="{FF2B5EF4-FFF2-40B4-BE49-F238E27FC236}">
+                <a16:creationId xmlns:a16="http://schemas.microsoft.com/office/drawing/2014/main" id="{3B2E3793-BFE6-45A2-9B7B-E18844431C99}"/>
+              </a:ext>
+              <a:ext uri="{C183D7F6-B498-43B3-948B-1728B52AA6E4}">
+                <adec:decorative xmlns:adec="http://schemas.microsoft.com/office/drawing/2017/decorative" val="1"/>
+              </a:ext>
+            </a:extLst>
+          </p:cNvPr>
+          <p:cNvSpPr>
+            <a:spLocks noGrp="1" noRot="1" noChangeAspect="1" noMove="1" noResize="1" noEditPoints="1" noAdjustHandles="1" noChangeArrowheads="1" noChangeShapeType="1" noTextEdit="1"/>
+          </p:cNvSpPr>
+          <p:nvPr>
+            <p:extLst>
+              <p:ext uri="{386F3935-93C4-4BCD-93E2-E3B085C9AB24}">
+                <p16:designElem xmlns:p16="http://schemas.microsoft.com/office/powerpoint/2015/main" val="1"/>
+              </p:ext>
+            </p:extLst>
+          </p:nvPr>
+        </p:nvSpPr>
+        <p:spPr>
+          <a:xfrm flipH="1">
+            <a:off x="-1" y="-1"/>
+            <a:ext cx="12191998" cy="1590742"/>
+          </a:xfrm>
+          <a:prstGeom prst="rect">
+            <a:avLst/>
+          </a:prstGeom>
+          <a:gradFill>
+            <a:gsLst>
+              <a:gs pos="0">
+                <a:srgbClr val="000000"/>
+              </a:gs>
+              <a:gs pos="100000">
+                <a:schemeClr val="accent1">
+                  <a:lumMod val="75000"/>
+                </a:schemeClr>
+              </a:gs>
+            </a:gsLst>
+            <a:lin ang="8400000" scaled="0"/>
+          </a:gradFill>
+          <a:ln>
+            <a:noFill/>
+          </a:ln>
+        </p:spPr>
+        <p:style>
+          <a:lnRef idx="2">
+            <a:schemeClr val="accent1">
+              <a:shade val="50000"/>
+            </a:schemeClr>
+          </a:lnRef>
+          <a:fillRef idx="1">
+            <a:schemeClr val="accent1"/>
+          </a:fillRef>
+          <a:effectRef idx="0">
+            <a:schemeClr val="accent1"/>
+          </a:effectRef>
+          <a:fontRef idx="minor">
+            <a:schemeClr val="lt1"/>
+          </a:fontRef>
+        </p:style>
+        <p:txBody>
+          <a:bodyPr rtlCol="0" anchor="ctr"/>
+          <a:lstStyle/>
+          <a:p>
+            <a:pPr algn="ctr"/>
+            <a:endParaRPr lang="en-US"/>
+          </a:p>
+        </p:txBody>
+      </p:sp>
+      <p:sp>
+        <p:nvSpPr>
+          <p:cNvPr id="12" name="Rectangle 11">
+            <a:extLst>
+              <a:ext uri="{FF2B5EF4-FFF2-40B4-BE49-F238E27FC236}">
+                <a16:creationId xmlns:a16="http://schemas.microsoft.com/office/drawing/2014/main" id="{BC4C4868-CB8F-4AF9-9CDB-8108F2C19B67}"/>
+              </a:ext>
+              <a:ext uri="{C183D7F6-B498-43B3-948B-1728B52AA6E4}">
+                <adec:decorative xmlns:adec="http://schemas.microsoft.com/office/drawing/2017/decorative" val="1"/>
+              </a:ext>
+            </a:extLst>
+          </p:cNvPr>
+          <p:cNvSpPr>
+            <a:spLocks noGrp="1" noRot="1" noChangeAspect="1" noMove="1" noResize="1" noEditPoints="1" noAdjustHandles="1" noChangeArrowheads="1" noChangeShapeType="1" noTextEdit="1"/>
+          </p:cNvSpPr>
+          <p:nvPr>
+            <p:extLst>
+              <p:ext uri="{386F3935-93C4-4BCD-93E2-E3B085C9AB24}">
+                <p16:designElem xmlns:p16="http://schemas.microsoft.com/office/powerpoint/2015/main" val="1"/>
+              </p:ext>
+            </p:extLst>
+          </p:nvPr>
+        </p:nvSpPr>
+        <p:spPr>
+          <a:xfrm rot="10800000" flipH="1">
+            <a:off x="-3" y="0"/>
+            <a:ext cx="8115306" cy="1590742"/>
+          </a:xfrm>
+          <a:prstGeom prst="rect">
+            <a:avLst/>
+          </a:prstGeom>
+          <a:gradFill>
+            <a:gsLst>
+              <a:gs pos="20000">
+                <a:schemeClr val="accent1">
+                  <a:alpha val="0"/>
+                </a:schemeClr>
+              </a:gs>
+              <a:gs pos="100000">
+                <a:schemeClr val="accent1">
+                  <a:lumMod val="50000"/>
+                  <a:alpha val="55000"/>
+                </a:schemeClr>
+              </a:gs>
+            </a:gsLst>
+            <a:lin ang="13800000" scaled="0"/>
+          </a:gradFill>
+          <a:ln>
+            <a:noFill/>
+          </a:ln>
+        </p:spPr>
+        <p:style>
+          <a:lnRef idx="2">
+            <a:schemeClr val="accent1">
+              <a:shade val="50000"/>
+            </a:schemeClr>
+          </a:lnRef>
+          <a:fillRef idx="1">
+            <a:schemeClr val="accent1"/>
+          </a:fillRef>
+          <a:effectRef idx="0">
+            <a:schemeClr val="accent1"/>
+          </a:effectRef>
+          <a:fontRef idx="minor">
+            <a:schemeClr val="lt1"/>
+          </a:fontRef>
+        </p:style>
+        <p:txBody>
+          <a:bodyPr rtlCol="0" anchor="ctr"/>
+          <a:lstStyle/>
+          <a:p>
+            <a:pPr algn="ctr"/>
+            <a:endParaRPr lang="en-US"/>
+          </a:p>
+        </p:txBody>
+      </p:sp>
+      <p:sp>
+        <p:nvSpPr>
+          <p:cNvPr id="14" name="Rectangle 13">
+            <a:extLst>
+              <a:ext uri="{FF2B5EF4-FFF2-40B4-BE49-F238E27FC236}">
+                <a16:creationId xmlns:a16="http://schemas.microsoft.com/office/drawing/2014/main" id="{375E0459-6403-40CD-989D-56A4407CA12E}"/>
+              </a:ext>
+              <a:ext uri="{C183D7F6-B498-43B3-948B-1728B52AA6E4}">
+                <adec:decorative xmlns:adec="http://schemas.microsoft.com/office/drawing/2017/decorative" val="1"/>
+              </a:ext>
+            </a:extLst>
+          </p:cNvPr>
+          <p:cNvSpPr>
+            <a:spLocks noGrp="1" noRot="1" noChangeAspect="1" noMove="1" noResize="1" noEditPoints="1" noAdjustHandles="1" noChangeArrowheads="1" noChangeShapeType="1" noTextEdit="1"/>
+          </p:cNvSpPr>
+          <p:nvPr>
+            <p:extLst>
+              <p:ext uri="{386F3935-93C4-4BCD-93E2-E3B085C9AB24}">
+                <p16:designElem xmlns:p16="http://schemas.microsoft.com/office/powerpoint/2015/main" val="1"/>
+              </p:ext>
+            </p:extLst>
+          </p:nvPr>
+        </p:nvSpPr>
+        <p:spPr>
+          <a:xfrm flipH="1">
+            <a:off x="8115299" y="-1"/>
+            <a:ext cx="4076698" cy="1590742"/>
+          </a:xfrm>
+          <a:prstGeom prst="rect">
+            <a:avLst/>
+          </a:prstGeom>
+          <a:gradFill>
+            <a:gsLst>
+              <a:gs pos="0">
+                <a:schemeClr val="accent1">
+                  <a:alpha val="66000"/>
+                </a:schemeClr>
+              </a:gs>
+              <a:gs pos="100000">
+                <a:srgbClr val="000000">
+                  <a:alpha val="30000"/>
+                </a:srgbClr>
+              </a:gs>
+            </a:gsLst>
+            <a:lin ang="13200000" scaled="0"/>
+          </a:gradFill>
+          <a:ln>
+            <a:noFill/>
+          </a:ln>
+        </p:spPr>
+        <p:style>
+          <a:lnRef idx="2">
+            <a:schemeClr val="accent1">
+              <a:shade val="50000"/>
+            </a:schemeClr>
+          </a:lnRef>
+          <a:fillRef idx="1">
+            <a:schemeClr val="accent1"/>
+          </a:fillRef>
+          <a:effectRef idx="0">
+            <a:schemeClr val="accent1"/>
+          </a:effectRef>
+          <a:fontRef idx="minor">
+            <a:schemeClr val="lt1"/>
+          </a:fontRef>
+        </p:style>
+        <p:txBody>
+          <a:bodyPr rtlCol="0" anchor="ctr"/>
+          <a:lstStyle/>
+          <a:p>
+            <a:pPr algn="ctr"/>
+            <a:endParaRPr lang="en-US"/>
+          </a:p>
+        </p:txBody>
+      </p:sp>
+      <p:sp>
+        <p:nvSpPr>
+          <p:cNvPr id="16" name="Rectangle 15">
+            <a:extLst>
+              <a:ext uri="{FF2B5EF4-FFF2-40B4-BE49-F238E27FC236}">
+                <a16:creationId xmlns:a16="http://schemas.microsoft.com/office/drawing/2014/main" id="{53E5B1A8-3AC9-4BD1-9BBC-78CA94F2D1BA}"/>
+              </a:ext>
+              <a:ext uri="{C183D7F6-B498-43B3-948B-1728B52AA6E4}">
+                <adec:decorative xmlns:adec="http://schemas.microsoft.com/office/drawing/2017/decorative" val="1"/>
+              </a:ext>
+            </a:extLst>
+          </p:cNvPr>
+          <p:cNvSpPr>
+            <a:spLocks noGrp="1" noRot="1" noChangeAspect="1" noMove="1" noResize="1" noEditPoints="1" noAdjustHandles="1" noChangeArrowheads="1" noChangeShapeType="1" noTextEdit="1"/>
+          </p:cNvSpPr>
+          <p:nvPr>
+            <p:extLst>
+              <p:ext uri="{386F3935-93C4-4BCD-93E2-E3B085C9AB24}">
+                <p16:designElem xmlns:p16="http://schemas.microsoft.com/office/powerpoint/2015/main" val="1"/>
+              </p:ext>
+            </p:extLst>
+          </p:nvPr>
+        </p:nvSpPr>
+        <p:spPr>
+          <a:xfrm>
+            <a:off x="459350" y="-1"/>
+            <a:ext cx="11732646" cy="1597433"/>
+          </a:xfrm>
+          <a:prstGeom prst="rect">
+            <a:avLst/>
+          </a:prstGeom>
+          <a:gradFill>
+            <a:gsLst>
+              <a:gs pos="50000">
+                <a:srgbClr val="000000">
+                  <a:alpha val="0"/>
+                </a:srgbClr>
+              </a:gs>
+              <a:gs pos="99000">
+                <a:schemeClr val="accent1">
+                  <a:lumMod val="50000"/>
+                  <a:alpha val="52000"/>
+                </a:schemeClr>
+              </a:gs>
+            </a:gsLst>
+            <a:lin ang="16800000" scaled="0"/>
+          </a:gradFill>
+          <a:ln>
+            <a:noFill/>
+          </a:ln>
+        </p:spPr>
+        <p:style>
+          <a:lnRef idx="2">
+            <a:schemeClr val="accent1">
+              <a:shade val="50000"/>
+            </a:schemeClr>
+          </a:lnRef>
+          <a:fillRef idx="1">
+            <a:schemeClr val="accent1"/>
+          </a:fillRef>
+          <a:effectRef idx="0">
+            <a:schemeClr val="accent1"/>
+          </a:effectRef>
+          <a:fontRef idx="minor">
+            <a:schemeClr val="lt1"/>
+          </a:fontRef>
+        </p:style>
+        <p:txBody>
+          <a:bodyPr rtlCol="0" anchor="ctr"/>
+          <a:lstStyle/>
+          <a:p>
+            <a:pPr algn="ctr"/>
+            <a:endParaRPr lang="en-US"/>
+          </a:p>
+        </p:txBody>
+      </p:sp>
+      <p:sp>
+        <p:nvSpPr>
+          <p:cNvPr id="2" name="Title 1">
+            <a:extLst>
+              <a:ext uri="{FF2B5EF4-FFF2-40B4-BE49-F238E27FC236}">
+                <a16:creationId xmlns:a16="http://schemas.microsoft.com/office/drawing/2014/main" id="{F021F42D-C8FD-AD49-8558-0FBB5D132A79}"/>
+              </a:ext>
+            </a:extLst>
+          </p:cNvPr>
+          <p:cNvSpPr>
+            <a:spLocks noGrp="1"/>
+          </p:cNvSpPr>
+          <p:nvPr>
+            <p:ph type="title"/>
+          </p:nvPr>
+        </p:nvSpPr>
+        <p:spPr>
+          <a:xfrm>
+            <a:off x="1371599" y="294538"/>
+            <a:ext cx="9895951" cy="1033669"/>
+          </a:xfrm>
+        </p:spPr>
+        <p:txBody>
+          <a:bodyPr>
+            <a:normAutofit/>
+          </a:bodyPr>
+          <a:lstStyle/>
+          <a:p>
+            <a:r>
+              <a:rPr lang="ar-AE" sz="4000">
+                <a:solidFill>
+                  <a:srgbClr val="FFFFFF"/>
+                </a:solidFill>
+              </a:rPr>
+              <a:t>الوصف والخلفية</a:t>
+            </a:r>
+            <a:endParaRPr lang="en-US" sz="4000">
+              <a:solidFill>
+                <a:srgbClr val="FFFFFF"/>
+              </a:solidFill>
+            </a:endParaRPr>
+          </a:p>
+        </p:txBody>
+      </p:sp>
+      <p:sp>
+        <p:nvSpPr>
+          <p:cNvPr id="3" name="Content Placeholder 2">
+            <a:extLst>
+              <a:ext uri="{FF2B5EF4-FFF2-40B4-BE49-F238E27FC236}">
+                <a16:creationId xmlns:a16="http://schemas.microsoft.com/office/drawing/2014/main" id="{C523154E-DB46-7F4B-858D-10D18C594AEB}"/>
+              </a:ext>
+            </a:extLst>
+          </p:cNvPr>
+          <p:cNvSpPr>
+            <a:spLocks noGrp="1"/>
+          </p:cNvSpPr>
+          <p:nvPr>
+            <p:ph idx="1"/>
+          </p:nvPr>
+        </p:nvSpPr>
+        <p:spPr>
+          <a:xfrm>
+            <a:off x="1371599" y="2318197"/>
+            <a:ext cx="9724031" cy="3683358"/>
+          </a:xfrm>
+        </p:spPr>
+        <p:txBody>
+          <a:bodyPr anchor="ctr">
+            <a:normAutofit/>
+          </a:bodyPr>
+          <a:lstStyle/>
+          <a:p>
+            <a:pPr marL="0" indent="0">
+              <a:buNone/>
+            </a:pPr>
+            <a:r>
+              <a:rPr lang="ar-AE" sz="1700" dirty="0"/>
+              <a:t>البرنامج مكتوب بلغة البرمجة</a:t>
+            </a:r>
+            <a:r>
+              <a:rPr lang="ar-SA" sz="1700" dirty="0"/>
+              <a:t>: </a:t>
+            </a:r>
+            <a:endParaRPr lang="en-US" sz="1700" dirty="0"/>
+          </a:p>
+          <a:p>
+            <a:pPr marL="0" indent="0">
+              <a:buNone/>
+            </a:pPr>
+            <a:r>
+              <a:rPr lang="en-US" sz="1700" dirty="0"/>
+              <a:t>Python</a:t>
+            </a:r>
+          </a:p>
+          <a:p>
+            <a:pPr marL="0" indent="0">
+              <a:buNone/>
+            </a:pPr>
+            <a:endParaRPr lang="en-US" sz="1700" dirty="0"/>
+          </a:p>
+          <a:p>
+            <a:pPr marL="0" indent="0">
+              <a:buNone/>
+            </a:pPr>
+            <a:r>
+              <a:rPr lang="en-US" sz="1700" u="sng" dirty="0"/>
+              <a:t>Frontend</a:t>
+            </a:r>
+          </a:p>
+          <a:p>
+            <a:pPr marL="0" indent="0">
+              <a:buNone/>
+            </a:pPr>
+            <a:r>
+              <a:rPr lang="ar-AE" sz="1700" dirty="0"/>
+              <a:t>واجهة مستخدم مكتوبة باستخدام وحدة </a:t>
+            </a:r>
+            <a:r>
+              <a:rPr lang="en-US" sz="1700" dirty="0" err="1"/>
+              <a:t>PyQt</a:t>
+            </a:r>
+            <a:endParaRPr lang="en-US" sz="1700" dirty="0"/>
+          </a:p>
+          <a:p>
+            <a:pPr marL="0" indent="0">
+              <a:buNone/>
+            </a:pPr>
+            <a:endParaRPr lang="en-US" sz="1700" dirty="0"/>
+          </a:p>
+          <a:p>
+            <a:pPr marL="0" indent="0">
+              <a:buNone/>
+            </a:pPr>
+            <a:r>
+              <a:rPr lang="en-US" sz="1700" u="sng" dirty="0"/>
+              <a:t>Backend</a:t>
+            </a:r>
+            <a:endParaRPr lang="en-US" sz="1700" dirty="0"/>
+          </a:p>
+          <a:p>
+            <a:pPr marL="0" indent="0">
+              <a:buNone/>
+            </a:pPr>
+            <a:r>
+              <a:rPr lang="en-US" sz="1700" dirty="0"/>
+              <a:t> </a:t>
+            </a:r>
+            <a:r>
+              <a:rPr lang="ar-AE" sz="1700" dirty="0"/>
+              <a:t>فحص عناوين انترنت مع اوامر </a:t>
+            </a:r>
+            <a:r>
+              <a:rPr lang="en-US" sz="1700" dirty="0" err="1"/>
+              <a:t>nmap</a:t>
+            </a:r>
+            <a:endParaRPr lang="en-US" sz="1700" dirty="0"/>
+          </a:p>
+          <a:p>
+            <a:pPr marL="0" indent="0">
+              <a:buNone/>
+            </a:pPr>
+            <a:r>
+              <a:rPr lang="en-US" sz="1700" dirty="0"/>
+              <a:t>Async functions supported</a:t>
+            </a:r>
+          </a:p>
+          <a:p>
+            <a:pPr marL="0" indent="0">
+              <a:buNone/>
+            </a:pPr>
+            <a:r>
+              <a:rPr lang="ar-AE" sz="1700" dirty="0"/>
+              <a:t>تعريف وبحث عن الثغرات باستخدام خدمة </a:t>
+            </a:r>
+            <a:r>
+              <a:rPr lang="en-US" sz="1700" dirty="0"/>
+              <a:t>NVD API</a:t>
+            </a:r>
+          </a:p>
+        </p:txBody>
+      </p:sp>
+    </p:spTree>
+    <p:extLst>
+      <p:ext uri="{BB962C8B-B14F-4D97-AF65-F5344CB8AC3E}">
+        <p14:creationId xmlns:p14="http://schemas.microsoft.com/office/powerpoint/2010/main" val="205484818"/>
+      </p:ext>
+    </p:extLst>
+  </p:cSld>
+  <p:clrMapOvr>
+    <a:masterClrMapping/>
+  </p:clrMapOvr>
+</p:sld>
+</file>
+
+<file path=ppt/slides/slide5.xml><?xml version="1.0" encoding="utf-8"?>
+<p:sld xmlns:a="http://schemas.openxmlformats.org/drawingml/2006/main" xmlns:r="http://schemas.openxmlformats.org/officeDocument/2006/relationships" xmlns:p="http://schemas.openxmlformats.org/presentationml/2006/main">
+  <p:cSld>
+    <p:spTree>
+      <p:nvGrpSpPr>
+        <p:cNvPr id="1" name=""/>
+        <p:cNvGrpSpPr/>
+        <p:nvPr/>
+      </p:nvGrpSpPr>
+      <p:grpSpPr>
+        <a:xfrm>
+          <a:off x="0" y="0"/>
+          <a:ext cx="0" cy="0"/>
+          <a:chOff x="0" y="0"/>
+          <a:chExt cx="0" cy="0"/>
+        </a:xfrm>
+      </p:grpSpPr>
+      <p:sp>
+        <p:nvSpPr>
+          <p:cNvPr id="2" name="Title 1">
+            <a:extLst>
+              <a:ext uri="{FF2B5EF4-FFF2-40B4-BE49-F238E27FC236}">
+                <a16:creationId xmlns:a16="http://schemas.microsoft.com/office/drawing/2014/main" id="{CFE1F2CC-60FC-6740-9398-472D589542C4}"/>
+              </a:ext>
+            </a:extLst>
+          </p:cNvPr>
+          <p:cNvSpPr>
+            <a:spLocks noGrp="1"/>
+          </p:cNvSpPr>
+          <p:nvPr>
+            <p:ph type="title"/>
+          </p:nvPr>
+        </p:nvSpPr>
+        <p:spPr/>
+        <p:txBody>
+          <a:bodyPr/>
+          <a:lstStyle/>
+          <a:p>
+            <a:r>
+              <a:rPr lang="en-US" dirty="0"/>
+              <a:t>Flowchart</a:t>
+            </a:r>
+          </a:p>
+        </p:txBody>
+      </p:sp>
+      <p:pic>
+        <p:nvPicPr>
+          <p:cNvPr id="5" name="Content Placeholder 4">
+            <a:extLst>
+              <a:ext uri="{FF2B5EF4-FFF2-40B4-BE49-F238E27FC236}">
+                <a16:creationId xmlns:a16="http://schemas.microsoft.com/office/drawing/2014/main" id="{B7B75901-EAFF-4AAF-B9CF-2418F6603172}"/>
+              </a:ext>
+            </a:extLst>
+          </p:cNvPr>
+          <p:cNvPicPr>
+            <a:picLocks noGrp="1" noChangeAspect="1"/>
+          </p:cNvPicPr>
+          <p:nvPr>
+            <p:ph idx="1"/>
+          </p:nvPr>
+        </p:nvPicPr>
+        <p:blipFill>
+          <a:blip r:embed="rId2"/>
+          <a:stretch>
+            <a:fillRect/>
+          </a:stretch>
+        </p:blipFill>
+        <p:spPr>
+          <a:xfrm>
+            <a:off x="434106" y="1337693"/>
+            <a:ext cx="11323788" cy="5327202"/>
+          </a:xfrm>
+        </p:spPr>
+      </p:pic>
+    </p:spTree>
+    <p:extLst>
+      <p:ext uri="{BB962C8B-B14F-4D97-AF65-F5344CB8AC3E}">
+        <p14:creationId xmlns:p14="http://schemas.microsoft.com/office/powerpoint/2010/main" val="3746758601"/>
+      </p:ext>
+    </p:extLst>
+  </p:cSld>
+  <p:clrMapOvr>
+    <a:masterClrMapping/>
+  </p:clrMapOvr>
+</p:sld>
+</file>
+
+<file path=ppt/slides/slide6.xml><?xml version="1.0" encoding="utf-8"?>
+<p:sld xmlns:a="http://schemas.openxmlformats.org/drawingml/2006/main" xmlns:r="http://schemas.openxmlformats.org/officeDocument/2006/relationships" xmlns:p="http://schemas.openxmlformats.org/presentationml/2006/main">
+  <p:cSld>
+    <p:spTree>
+      <p:nvGrpSpPr>
+        <p:cNvPr id="1" name=""/>
+        <p:cNvGrpSpPr/>
+        <p:nvPr/>
+      </p:nvGrpSpPr>
+      <p:grpSpPr>
+        <a:xfrm>
+          <a:off x="0" y="0"/>
+          <a:ext cx="0" cy="0"/>
+          <a:chOff x="0" y="0"/>
+          <a:chExt cx="0" cy="0"/>
+        </a:xfrm>
+      </p:grpSpPr>
+      <p:sp>
+        <p:nvSpPr>
+          <p:cNvPr id="2" name="Title 1">
+            <a:extLst>
+              <a:ext uri="{FF2B5EF4-FFF2-40B4-BE49-F238E27FC236}">
+                <a16:creationId xmlns:a16="http://schemas.microsoft.com/office/drawing/2014/main" id="{62482E0A-9A6E-344B-9DFE-0364D2C21CD0}"/>
+              </a:ext>
+            </a:extLst>
+          </p:cNvPr>
+          <p:cNvSpPr>
+            <a:spLocks noGrp="1"/>
+          </p:cNvSpPr>
+          <p:nvPr>
+            <p:ph type="title"/>
+          </p:nvPr>
+        </p:nvSpPr>
+        <p:spPr/>
+        <p:txBody>
+          <a:bodyPr/>
+          <a:lstStyle/>
+          <a:p>
+            <a:pPr algn="r"/>
+            <a:r>
+              <a:rPr lang="ar-AE" dirty="0"/>
+              <a:t>طريقة تنزيل البرنامج</a:t>
+            </a:r>
+            <a:endParaRPr lang="en-US" dirty="0"/>
+          </a:p>
+        </p:txBody>
+      </p:sp>
+      <p:sp>
+        <p:nvSpPr>
+          <p:cNvPr id="3" name="Content Placeholder 2">
+            <a:extLst>
+              <a:ext uri="{FF2B5EF4-FFF2-40B4-BE49-F238E27FC236}">
+                <a16:creationId xmlns:a16="http://schemas.microsoft.com/office/drawing/2014/main" id="{F4C11C4E-AA3D-0249-A4ED-8BCD38092DA4}"/>
+              </a:ext>
+            </a:extLst>
+          </p:cNvPr>
+          <p:cNvSpPr>
+            <a:spLocks noGrp="1"/>
+          </p:cNvSpPr>
+          <p:nvPr>
+            <p:ph idx="1"/>
+          </p:nvPr>
+        </p:nvSpPr>
+        <p:spPr>
+          <a:xfrm>
+            <a:off x="838200" y="1581806"/>
+            <a:ext cx="10515600" cy="5276194"/>
+          </a:xfrm>
+        </p:spPr>
+        <p:txBody>
+          <a:bodyPr>
+            <a:normAutofit lnSpcReduction="10000"/>
+          </a:bodyPr>
+          <a:lstStyle/>
+          <a:p>
+            <a:pPr marL="0" indent="0" algn="r">
+              <a:buNone/>
+            </a:pPr>
+            <a:r>
+              <a:rPr lang="ar-AE" dirty="0"/>
+              <a:t>يتم تغليف البرنامج واحتياجاتها الى ملف امري واحد لتسهيل التوزيع والتنزيل على جميع الاجهزة عن طريق </a:t>
+            </a:r>
+            <a:r>
+              <a:rPr lang="ar-SA" dirty="0"/>
+              <a:t>:</a:t>
+            </a:r>
+            <a:endParaRPr lang="en-US" dirty="0"/>
+          </a:p>
+          <a:p>
+            <a:pPr marL="0" indent="0" algn="r">
+              <a:buNone/>
+            </a:pPr>
+            <a:r>
+              <a:rPr lang="en-US" dirty="0">
+                <a:latin typeface="Courier New" panose="02070309020205020404" pitchFamily="49" charset="0"/>
+                <a:cs typeface="Courier New" panose="02070309020205020404" pitchFamily="49" charset="0"/>
+              </a:rPr>
+              <a:t>python (</a:t>
+            </a:r>
+            <a:r>
+              <a:rPr lang="en-US" dirty="0" err="1">
+                <a:latin typeface="Courier New" panose="02070309020205020404" pitchFamily="49" charset="0"/>
+                <a:cs typeface="Courier New" panose="02070309020205020404" pitchFamily="49" charset="0"/>
+              </a:rPr>
+              <a:t>pyinstaller</a:t>
+            </a:r>
+            <a:r>
+              <a:rPr lang="en-US" dirty="0">
+                <a:latin typeface="Courier New" panose="02070309020205020404" pitchFamily="49" charset="0"/>
+                <a:cs typeface="Courier New" panose="02070309020205020404" pitchFamily="49" charset="0"/>
+              </a:rPr>
+              <a:t>)</a:t>
+            </a:r>
+          </a:p>
+          <a:p>
+            <a:pPr marL="0" indent="0" algn="r">
+              <a:buNone/>
+            </a:pPr>
+            <a:endParaRPr lang="en-US" dirty="0">
+              <a:latin typeface="Courier New" panose="02070309020205020404" pitchFamily="49" charset="0"/>
+              <a:cs typeface="Courier New" panose="02070309020205020404" pitchFamily="49" charset="0"/>
+            </a:endParaRPr>
+          </a:p>
+          <a:p>
+            <a:pPr marL="0" indent="0" algn="r">
+              <a:buNone/>
+            </a:pPr>
+            <a:r>
+              <a:rPr lang="ar-AE" dirty="0">
+                <a:latin typeface="Arial" panose="020B0604020202020204" pitchFamily="34" charset="0"/>
+                <a:cs typeface="Arial" panose="020B0604020202020204" pitchFamily="34" charset="0"/>
+              </a:rPr>
+              <a:t>لتشغيل البرنامج مجرد ان تكبسه في برنامج الملفات او تكتب الامر في سطر الأوامر</a:t>
+            </a:r>
+            <a:endParaRPr lang="en-US" dirty="0">
+              <a:latin typeface="Arial" panose="020B0604020202020204" pitchFamily="34" charset="0"/>
+              <a:cs typeface="Arial" panose="020B0604020202020204" pitchFamily="34" charset="0"/>
+            </a:endParaRPr>
+          </a:p>
+          <a:p>
+            <a:pPr marL="0" indent="0" algn="r">
+              <a:buNone/>
+            </a:pPr>
+            <a:endParaRPr lang="en-US" dirty="0">
+              <a:latin typeface="Arial" panose="020B0604020202020204" pitchFamily="34" charset="0"/>
+              <a:cs typeface="Arial" panose="020B0604020202020204" pitchFamily="34" charset="0"/>
+            </a:endParaRPr>
+          </a:p>
+          <a:p>
+            <a:pPr marL="0" indent="0" algn="r">
+              <a:buNone/>
+            </a:pPr>
+            <a:r>
+              <a:rPr lang="ar-AE" dirty="0">
+                <a:latin typeface="Arial" panose="020B0604020202020204" pitchFamily="34" charset="0"/>
+                <a:cs typeface="Arial" panose="020B0604020202020204" pitchFamily="34" charset="0"/>
+              </a:rPr>
+              <a:t>سيقوم البرنامج تلقائيًا بفحص إذا كان الأمر نازل على جهاز المستخدم</a:t>
+            </a:r>
+            <a:r>
+              <a:rPr lang="ar-SA" dirty="0">
+                <a:latin typeface="Arial" panose="020B0604020202020204" pitchFamily="34" charset="0"/>
+                <a:cs typeface="Arial" panose="020B0604020202020204" pitchFamily="34" charset="0"/>
+              </a:rPr>
+              <a:t>:</a:t>
+            </a:r>
+            <a:endParaRPr lang="en-US" dirty="0">
+              <a:latin typeface="Arial" panose="020B0604020202020204" pitchFamily="34" charset="0"/>
+              <a:cs typeface="Arial" panose="020B0604020202020204" pitchFamily="34" charset="0"/>
+            </a:endParaRPr>
+          </a:p>
+          <a:p>
+            <a:pPr marL="0" indent="0" algn="r">
+              <a:buNone/>
+            </a:pPr>
+            <a:r>
+              <a:rPr lang="en-US" dirty="0">
+                <a:latin typeface="Courier New" panose="02070309020205020404" pitchFamily="49" charset="0"/>
+                <a:cs typeface="Courier New" panose="02070309020205020404" pitchFamily="49" charset="0"/>
+              </a:rPr>
+              <a:t>which </a:t>
+            </a:r>
+            <a:r>
+              <a:rPr lang="en-US" dirty="0" err="1">
+                <a:latin typeface="Courier New" panose="02070309020205020404" pitchFamily="49" charset="0"/>
+                <a:cs typeface="Courier New" panose="02070309020205020404" pitchFamily="49" charset="0"/>
+              </a:rPr>
+              <a:t>nmap</a:t>
+            </a:r>
+            <a:endParaRPr lang="en-US" dirty="0">
+              <a:latin typeface="Courier New" panose="02070309020205020404" pitchFamily="49" charset="0"/>
+              <a:cs typeface="Courier New" panose="02070309020205020404" pitchFamily="49" charset="0"/>
+            </a:endParaRPr>
+          </a:p>
+          <a:p>
+            <a:pPr marL="0" indent="0" algn="r">
+              <a:buNone/>
+            </a:pPr>
+            <a:endParaRPr lang="en-US" dirty="0">
+              <a:latin typeface="Courier New" panose="02070309020205020404" pitchFamily="49" charset="0"/>
+              <a:cs typeface="Courier New" panose="02070309020205020404" pitchFamily="49" charset="0"/>
+            </a:endParaRPr>
+          </a:p>
+          <a:p>
+            <a:pPr marL="0" indent="0" algn="r">
+              <a:buNone/>
+            </a:pPr>
+            <a:r>
+              <a:rPr lang="ar-AE" dirty="0">
+                <a:latin typeface="Arial" panose="020B0604020202020204" pitchFamily="34" charset="0"/>
+                <a:cs typeface="Arial" panose="020B0604020202020204" pitchFamily="34" charset="0"/>
+              </a:rPr>
+              <a:t>إذا لم يتم تثبيته، فسيطلب البرنامج كلمة مرور المستخدم لتنزيله على الجهاز</a:t>
+            </a:r>
+            <a:endParaRPr lang="en-US" dirty="0">
+              <a:latin typeface="Arial" panose="020B0604020202020204" pitchFamily="34" charset="0"/>
+              <a:cs typeface="Arial" panose="020B0604020202020204" pitchFamily="34" charset="0"/>
+            </a:endParaRPr>
+          </a:p>
+          <a:p>
+            <a:pPr marL="0" indent="0" algn="r">
+              <a:buNone/>
+            </a:pPr>
+            <a:r>
+              <a:rPr lang="ar-AE" dirty="0">
+                <a:latin typeface="Arial" panose="020B0604020202020204" pitchFamily="34" charset="0"/>
+                <a:cs typeface="Arial" panose="020B0604020202020204" pitchFamily="34" charset="0"/>
+              </a:rPr>
+              <a:t>هكذا، لا يضطر المستخدم القيام بأي إجراء يدوي</a:t>
+            </a:r>
+            <a:endParaRPr lang="en-US" dirty="0">
+              <a:latin typeface="Arial" panose="020B0604020202020204" pitchFamily="34" charset="0"/>
+              <a:cs typeface="Arial" panose="020B0604020202020204" pitchFamily="34" charset="0"/>
+            </a:endParaRPr>
+          </a:p>
+        </p:txBody>
+      </p:sp>
+      <p:pic>
+        <p:nvPicPr>
+          <p:cNvPr id="7" name="Picture 6" descr="A black and white screen&#10;&#10;Description automatically generated">
+            <a:extLst>
+              <a:ext uri="{FF2B5EF4-FFF2-40B4-BE49-F238E27FC236}">
+                <a16:creationId xmlns:a16="http://schemas.microsoft.com/office/drawing/2014/main" id="{44D3FD70-578E-9D42-978B-7B731200C17C}"/>
+              </a:ext>
+            </a:extLst>
+          </p:cNvPr>
+          <p:cNvPicPr>
+            <a:picLocks noChangeAspect="1"/>
+          </p:cNvPicPr>
+          <p:nvPr/>
+        </p:nvPicPr>
+        <p:blipFill>
+          <a:blip r:embed="rId2"/>
+          <a:stretch>
+            <a:fillRect/>
+          </a:stretch>
+        </p:blipFill>
+        <p:spPr>
+          <a:xfrm>
+            <a:off x="838200" y="365125"/>
+            <a:ext cx="3849130" cy="1108916"/>
+          </a:xfrm>
+          <a:prstGeom prst="rect">
+            <a:avLst/>
+          </a:prstGeom>
+        </p:spPr>
+      </p:pic>
+    </p:spTree>
+    <p:extLst>
+      <p:ext uri="{BB962C8B-B14F-4D97-AF65-F5344CB8AC3E}">
+        <p14:creationId xmlns:p14="http://schemas.microsoft.com/office/powerpoint/2010/main" val="3751610908"/>
+      </p:ext>
+    </p:extLst>
+  </p:cSld>
+  <p:clrMapOvr>
+    <a:masterClrMapping/>
+  </p:clrMapOvr>
+</p:sld>
+</file>
+
+<file path=ppt/slides/slide7.xml><?xml version="1.0" encoding="utf-8"?>
+<p:sld xmlns:a="http://schemas.openxmlformats.org/drawingml/2006/main" xmlns:r="http://schemas.openxmlformats.org/officeDocument/2006/relationships" xmlns:p="http://schemas.openxmlformats.org/presentationml/2006/main">
+  <p:cSld>
+    <p:spTree>
+      <p:nvGrpSpPr>
+        <p:cNvPr id="1" name=""/>
+        <p:cNvGrpSpPr/>
+        <p:nvPr/>
+      </p:nvGrpSpPr>
+      <p:grpSpPr>
+        <a:xfrm>
+          <a:off x="0" y="0"/>
+          <a:ext cx="0" cy="0"/>
+          <a:chOff x="0" y="0"/>
+          <a:chExt cx="0" cy="0"/>
+        </a:xfrm>
+      </p:grpSpPr>
+      <p:sp>
+        <p:nvSpPr>
+          <p:cNvPr id="2" name="Title 1">
+            <a:extLst>
+              <a:ext uri="{FF2B5EF4-FFF2-40B4-BE49-F238E27FC236}">
+                <a16:creationId xmlns:a16="http://schemas.microsoft.com/office/drawing/2014/main" id="{90236D24-AFE1-2A45-8ADD-F86DF08076CB}"/>
+              </a:ext>
+            </a:extLst>
+          </p:cNvPr>
+          <p:cNvSpPr>
+            <a:spLocks noGrp="1"/>
+          </p:cNvSpPr>
+          <p:nvPr>
+            <p:ph type="title"/>
+          </p:nvPr>
+        </p:nvSpPr>
+        <p:spPr/>
+        <p:txBody>
+          <a:bodyPr/>
+          <a:lstStyle/>
+          <a:p>
+            <a:pPr algn="r"/>
+            <a:r>
+              <a:rPr lang="ar-AE" dirty="0"/>
+              <a:t>مثال شاشة تشغيل البرنامج</a:t>
+            </a:r>
+            <a:endParaRPr lang="en-US" dirty="0"/>
+          </a:p>
+        </p:txBody>
+      </p:sp>
+      <p:pic>
+        <p:nvPicPr>
+          <p:cNvPr id="11" name="Content Placeholder 10" descr="A screenshot of a computer&#10;&#10;Description automatically generated">
+            <a:extLst>
+              <a:ext uri="{FF2B5EF4-FFF2-40B4-BE49-F238E27FC236}">
+                <a16:creationId xmlns:a16="http://schemas.microsoft.com/office/drawing/2014/main" id="{127AC702-98A3-8E41-BE1D-6CA6560395A2}"/>
+              </a:ext>
+            </a:extLst>
+          </p:cNvPr>
+          <p:cNvPicPr>
+            <a:picLocks noGrp="1" noChangeAspect="1"/>
+          </p:cNvPicPr>
+          <p:nvPr>
+            <p:ph idx="1"/>
+          </p:nvPr>
+        </p:nvPicPr>
+        <p:blipFill>
+          <a:blip r:embed="rId2"/>
+          <a:stretch>
+            <a:fillRect/>
+          </a:stretch>
+        </p:blipFill>
+        <p:spPr>
+          <a:xfrm>
+            <a:off x="367192" y="2066539"/>
+            <a:ext cx="3549714" cy="3734347"/>
+          </a:xfrm>
+        </p:spPr>
+      </p:pic>
+      <p:pic>
+        <p:nvPicPr>
+          <p:cNvPr id="13" name="Picture 12" descr="A screenshot of a computer&#10;&#10;Description automatically generated">
+            <a:extLst>
+              <a:ext uri="{FF2B5EF4-FFF2-40B4-BE49-F238E27FC236}">
+                <a16:creationId xmlns:a16="http://schemas.microsoft.com/office/drawing/2014/main" id="{271BD6D3-8448-794F-91E2-06FD8D9063C1}"/>
+              </a:ext>
+            </a:extLst>
+          </p:cNvPr>
+          <p:cNvPicPr>
+            <a:picLocks noChangeAspect="1"/>
+          </p:cNvPicPr>
+          <p:nvPr/>
+        </p:nvPicPr>
+        <p:blipFill>
+          <a:blip r:embed="rId3"/>
+          <a:stretch>
+            <a:fillRect/>
+          </a:stretch>
+        </p:blipFill>
+        <p:spPr>
+          <a:xfrm>
+            <a:off x="4200087" y="2098894"/>
+            <a:ext cx="3549715" cy="3669638"/>
+          </a:xfrm>
+          <a:prstGeom prst="rect">
+            <a:avLst/>
+          </a:prstGeom>
+        </p:spPr>
+      </p:pic>
+      <p:pic>
+        <p:nvPicPr>
+          <p:cNvPr id="15" name="Picture 14" descr="A screenshot of a computer&#10;&#10;Description automatically generated">
+            <a:extLst>
+              <a:ext uri="{FF2B5EF4-FFF2-40B4-BE49-F238E27FC236}">
+                <a16:creationId xmlns:a16="http://schemas.microsoft.com/office/drawing/2014/main" id="{63F0990C-239F-8D4B-9C98-53FC0C92CC2F}"/>
+              </a:ext>
+            </a:extLst>
+          </p:cNvPr>
+          <p:cNvPicPr>
+            <a:picLocks noChangeAspect="1"/>
+          </p:cNvPicPr>
+          <p:nvPr/>
+        </p:nvPicPr>
+        <p:blipFill>
+          <a:blip r:embed="rId4"/>
+          <a:stretch>
+            <a:fillRect/>
+          </a:stretch>
+        </p:blipFill>
+        <p:spPr>
+          <a:xfrm>
+            <a:off x="8032983" y="2098895"/>
+            <a:ext cx="3549714" cy="3645008"/>
+          </a:xfrm>
+          <a:prstGeom prst="rect">
+            <a:avLst/>
+          </a:prstGeom>
+        </p:spPr>
+      </p:pic>
+    </p:spTree>
+    <p:extLst>
+      <p:ext uri="{BB962C8B-B14F-4D97-AF65-F5344CB8AC3E}">
+        <p14:creationId xmlns:p14="http://schemas.microsoft.com/office/powerpoint/2010/main" val="1613703189"/>
+      </p:ext>
+    </p:extLst>
+  </p:cSld>
+  <p:clrMapOvr>
+    <a:masterClrMapping/>
+  </p:clrMapOvr>
+</p:sld>
+</file>
+
+<file path=ppt/slides/slide8.xml><?xml version="1.0" encoding="utf-8"?>
+<p:sld xmlns:a="http://schemas.openxmlformats.org/drawingml/2006/main" xmlns:r="http://schemas.openxmlformats.org/officeDocument/2006/relationships" xmlns:p="http://schemas.openxmlformats.org/presentationml/2006/main">
+  <p:cSld>
+    <p:spTree>
+      <p:nvGrpSpPr>
+        <p:cNvPr id="1" name=""/>
+        <p:cNvGrpSpPr/>
+        <p:nvPr/>
+      </p:nvGrpSpPr>
+      <p:grpSpPr>
+        <a:xfrm>
+          <a:off x="0" y="0"/>
+          <a:ext cx="0" cy="0"/>
+          <a:chOff x="0" y="0"/>
+          <a:chExt cx="0" cy="0"/>
+        </a:xfrm>
+      </p:grpSpPr>
+      <p:sp>
+        <p:nvSpPr>
+          <p:cNvPr id="2" name="Title 1">
+            <a:extLst>
+              <a:ext uri="{FF2B5EF4-FFF2-40B4-BE49-F238E27FC236}">
+                <a16:creationId xmlns:a16="http://schemas.microsoft.com/office/drawing/2014/main" id="{90236D24-AFE1-2A45-8ADD-F86DF08076CB}"/>
+              </a:ext>
+            </a:extLst>
+          </p:cNvPr>
+          <p:cNvSpPr>
+            <a:spLocks noGrp="1"/>
+          </p:cNvSpPr>
+          <p:nvPr>
+            <p:ph type="title"/>
+          </p:nvPr>
+        </p:nvSpPr>
+        <p:spPr/>
+        <p:txBody>
+          <a:bodyPr/>
+          <a:lstStyle/>
+          <a:p>
+            <a:pPr algn="r"/>
+            <a:r>
+              <a:rPr lang="ar-AE" dirty="0"/>
+              <a:t>مثال شاشة تشغيل البرنامج</a:t>
+            </a:r>
+            <a:endParaRPr lang="en-US" dirty="0"/>
+          </a:p>
+        </p:txBody>
+      </p:sp>
+      <p:pic>
+        <p:nvPicPr>
+          <p:cNvPr id="6" name="Content Placeholder 5" descr="A screenshot of a computer&#10;&#10;Description automatically generated">
+            <a:extLst>
+              <a:ext uri="{FF2B5EF4-FFF2-40B4-BE49-F238E27FC236}">
+                <a16:creationId xmlns:a16="http://schemas.microsoft.com/office/drawing/2014/main" id="{3597C1D5-B4FA-EC4D-A539-B005537FD448}"/>
+              </a:ext>
+            </a:extLst>
+          </p:cNvPr>
+          <p:cNvPicPr>
+            <a:picLocks noGrp="1" noChangeAspect="1"/>
+          </p:cNvPicPr>
+          <p:nvPr>
+            <p:ph idx="1"/>
+          </p:nvPr>
+        </p:nvPicPr>
+        <p:blipFill>
+          <a:blip r:embed="rId2"/>
+          <a:stretch>
+            <a:fillRect/>
+          </a:stretch>
+        </p:blipFill>
+        <p:spPr>
+          <a:xfrm>
+            <a:off x="1559862" y="1836136"/>
+            <a:ext cx="4174454" cy="4351338"/>
+          </a:xfrm>
+        </p:spPr>
+      </p:pic>
+      <p:pic>
+        <p:nvPicPr>
+          <p:cNvPr id="8" name="Picture 7" descr="A screenshot of a computer&#10;&#10;Description automatically generated">
+            <a:extLst>
+              <a:ext uri="{FF2B5EF4-FFF2-40B4-BE49-F238E27FC236}">
+                <a16:creationId xmlns:a16="http://schemas.microsoft.com/office/drawing/2014/main" id="{88A962FD-9746-A443-BBE5-7CC8416394D8}"/>
+              </a:ext>
+            </a:extLst>
+          </p:cNvPr>
+          <p:cNvPicPr>
+            <a:picLocks noChangeAspect="1"/>
+          </p:cNvPicPr>
+          <p:nvPr/>
+        </p:nvPicPr>
+        <p:blipFill>
+          <a:blip r:embed="rId3"/>
+          <a:stretch>
+            <a:fillRect/>
+          </a:stretch>
+        </p:blipFill>
+        <p:spPr>
+          <a:xfrm>
+            <a:off x="6096001" y="1817743"/>
+            <a:ext cx="4174454" cy="4355347"/>
+          </a:xfrm>
+          <a:prstGeom prst="rect">
+            <a:avLst/>
+          </a:prstGeom>
+        </p:spPr>
+      </p:pic>
+    </p:spTree>
+    <p:extLst>
+      <p:ext uri="{BB962C8B-B14F-4D97-AF65-F5344CB8AC3E}">
+        <p14:creationId xmlns:p14="http://schemas.microsoft.com/office/powerpoint/2010/main" val="2828524470"/>
+      </p:ext>
+    </p:extLst>
+  </p:cSld>
+  <p:clrMapOvr>
+    <a:masterClrMapping/>
+  </p:clrMapOvr>
+</p:sld>
+</file>
+
+<file path=ppt/slides/slide9.xml><?xml version="1.0" encoding="utf-8"?>
+<p:sld xmlns:a="http://schemas.openxmlformats.org/drawingml/2006/main" xmlns:r="http://schemas.openxmlformats.org/officeDocument/2006/relationships" xmlns:p="http://schemas.openxmlformats.org/presentationml/2006/main">
+  <p:cSld>
+    <p:bg>
+      <p:bgPr>
+        <a:solidFill>
+          <a:schemeClr val="bg1"/>
+        </a:solidFill>
+        <a:effectLst/>
+      </p:bgPr>
+    </p:bg>
+    <p:spTree>
+      <p:nvGrpSpPr>
+        <p:cNvPr id="1" name=""/>
+        <p:cNvGrpSpPr/>
+        <p:nvPr/>
+      </p:nvGrpSpPr>
+      <p:grpSpPr>
+        <a:xfrm>
+          <a:off x="0" y="0"/>
+          <a:ext cx="0" cy="0"/>
+          <a:chOff x="0" y="0"/>
+          <a:chExt cx="0" cy="0"/>
+        </a:xfrm>
+      </p:grpSpPr>
+      <p:sp useBgFill="1">
+        <p:nvSpPr>
+          <p:cNvPr id="9" name="Rectangle 8">
+            <a:extLst>
+              <a:ext uri="{FF2B5EF4-FFF2-40B4-BE49-F238E27FC236}">
+                <a16:creationId xmlns:a16="http://schemas.microsoft.com/office/drawing/2014/main" id="{BACC6370-2D7E-4714-9D71-7542949D7D5D}"/>
+              </a:ext>
+              <a:ext uri="{C183D7F6-B498-43B3-948B-1728B52AA6E4}">
+                <adec:decorative xmlns:adec="http://schemas.microsoft.com/office/drawing/2017/decorative" val="1"/>
+              </a:ext>
+            </a:extLst>
+          </p:cNvPr>
+          <p:cNvSpPr>
+            <a:spLocks noGrp="1" noRot="1" noChangeAspect="1" noMove="1" noResize="1" noEditPoints="1" noAdjustHandles="1" noChangeArrowheads="1" noChangeShapeType="1" noTextEdit="1"/>
+          </p:cNvSpPr>
+          <p:nvPr>
+            <p:extLst>
+              <p:ext uri="{386F3935-93C4-4BCD-93E2-E3B085C9AB24}">
+                <p16:designElem xmlns:p16="http://schemas.microsoft.com/office/powerpoint/2015/main" val="1"/>
+              </p:ext>
+            </p:extLst>
+          </p:nvPr>
+        </p:nvSpPr>
+        <p:spPr>
+          <a:xfrm>
+            <a:off x="0" y="0"/>
+            <a:ext cx="12192000" cy="6858000"/>
+          </a:xfrm>
+          <a:prstGeom prst="rect">
+            <a:avLst/>
+          </a:prstGeom>
+          <a:ln w="12700" cap="flat" cmpd="sng" algn="ctr">
+            <a:noFill/>
+            <a:prstDash val="solid"/>
+            <a:miter lim="800000"/>
+          </a:ln>
+          <a:effectLst/>
+          <a:extLst>
+            <a:ext uri="{91240B29-F687-4F45-9708-019B960494DF}">
+              <a14:hiddenLine xmlns:a14="http://schemas.microsoft.com/office/drawing/2010/main" w="12700" cap="flat" cmpd="sng" algn="ctr">
+                <a:solidFill>
+                  <a:schemeClr val="accent1">
+                    <a:shade val="50000"/>
+                  </a:schemeClr>
+                </a:solidFill>
+                <a:prstDash val="solid"/>
+                <a:miter lim="800000"/>
+              </a14:hiddenLine>
+            </a:ext>
+          </a:extLst>
+        </p:spPr>
+        <p:style>
+          <a:lnRef idx="2">
+            <a:schemeClr val="accent1">
+              <a:shade val="50000"/>
+            </a:schemeClr>
+          </a:lnRef>
+          <a:fillRef idx="1">
+            <a:schemeClr val="accent1"/>
+          </a:fillRef>
+          <a:effectRef idx="0">
+            <a:schemeClr val="accent1"/>
+          </a:effectRef>
+          <a:fontRef idx="minor">
+            <a:schemeClr val="lt1"/>
+          </a:fontRef>
+        </p:style>
+        <p:txBody>
+          <a:bodyPr rtlCol="0" anchor="ctr"/>
+          <a:lstStyle/>
+          <a:p>
+            <a:pPr algn="ctr"/>
+            <a:endParaRPr lang="en-US"/>
+          </a:p>
+        </p:txBody>
+      </p:sp>
+      <p:sp>
+        <p:nvSpPr>
+          <p:cNvPr id="11" name="Rectangle 10">
+            <a:extLst>
+              <a:ext uri="{FF2B5EF4-FFF2-40B4-BE49-F238E27FC236}">
+                <a16:creationId xmlns:a16="http://schemas.microsoft.com/office/drawing/2014/main" id="{F68B3F68-107C-434F-AA38-110D5EA91B85}"/>
+              </a:ext>
+              <a:ext uri="{C183D7F6-B498-43B3-948B-1728B52AA6E4}">
+                <adec:decorative xmlns:adec="http://schemas.microsoft.com/office/drawing/2017/decorative" val="1"/>
+              </a:ext>
+            </a:extLst>
+          </p:cNvPr>
+          <p:cNvSpPr>
+            <a:spLocks noGrp="1" noRot="1" noChangeAspect="1" noMove="1" noResize="1" noEditPoints="1" noAdjustHandles="1" noChangeArrowheads="1" noChangeShapeType="1" noTextEdit="1"/>
+          </p:cNvSpPr>
+          <p:nvPr>
+            <p:extLst>
+              <p:ext uri="{386F3935-93C4-4BCD-93E2-E3B085C9AB24}">
+                <p16:designElem xmlns:p16="http://schemas.microsoft.com/office/powerpoint/2015/main" val="1"/>
+              </p:ext>
+            </p:extLst>
+          </p:nvPr>
+        </p:nvSpPr>
+        <p:spPr>
+          <a:xfrm flipH="1">
+            <a:off x="2" y="0"/>
+            <a:ext cx="12191998" cy="1575955"/>
+          </a:xfrm>
+          <a:prstGeom prst="rect">
+            <a:avLst/>
+          </a:prstGeom>
+          <a:gradFill>
+            <a:gsLst>
+              <a:gs pos="0">
+                <a:srgbClr val="000000">
+                  <a:alpha val="96000"/>
+                </a:srgbClr>
+              </a:gs>
+              <a:gs pos="100000">
+                <a:schemeClr val="accent1">
+                  <a:lumMod val="75000"/>
+                </a:schemeClr>
+              </a:gs>
+            </a:gsLst>
+            <a:lin ang="8400000" scaled="0"/>
+          </a:gradFill>
+          <a:ln>
+            <a:noFill/>
+          </a:ln>
+        </p:spPr>
+        <p:style>
+          <a:lnRef idx="2">
+            <a:schemeClr val="accent1">
+              <a:shade val="50000"/>
+            </a:schemeClr>
+          </a:lnRef>
+          <a:fillRef idx="1">
+            <a:schemeClr val="accent1"/>
+          </a:fillRef>
+          <a:effectRef idx="0">
+            <a:schemeClr val="accent1"/>
+          </a:effectRef>
+          <a:fontRef idx="minor">
+            <a:schemeClr val="lt1"/>
+          </a:fontRef>
+        </p:style>
+        <p:txBody>
+          <a:bodyPr rtlCol="0" anchor="ctr"/>
+          <a:lstStyle/>
+          <a:p>
+            <a:pPr algn="ctr"/>
+            <a:endParaRPr lang="en-US"/>
+          </a:p>
+        </p:txBody>
+      </p:sp>
+      <p:sp>
+        <p:nvSpPr>
+          <p:cNvPr id="13" name="Rectangle 12">
+            <a:extLst>
+              <a:ext uri="{FF2B5EF4-FFF2-40B4-BE49-F238E27FC236}">
+                <a16:creationId xmlns:a16="http://schemas.microsoft.com/office/drawing/2014/main" id="{AAD0DBB9-1A4B-4391-81D4-CB19F9AB918A}"/>
+              </a:ext>
+              <a:ext uri="{C183D7F6-B498-43B3-948B-1728B52AA6E4}">
+                <adec:decorative xmlns:adec="http://schemas.microsoft.com/office/drawing/2017/decorative" val="1"/>
+              </a:ext>
+            </a:extLst>
+          </p:cNvPr>
+          <p:cNvSpPr>
+            <a:spLocks noGrp="1" noRot="1" noChangeAspect="1" noMove="1" noResize="1" noEditPoints="1" noAdjustHandles="1" noChangeArrowheads="1" noChangeShapeType="1" noTextEdit="1"/>
+          </p:cNvSpPr>
+          <p:nvPr>
+            <p:extLst>
+              <p:ext uri="{386F3935-93C4-4BCD-93E2-E3B085C9AB24}">
+                <p16:designElem xmlns:p16="http://schemas.microsoft.com/office/powerpoint/2015/main" val="1"/>
+              </p:ext>
+            </p:extLst>
+          </p:nvPr>
+        </p:nvSpPr>
+        <p:spPr>
+          <a:xfrm rot="10800000" flipH="1">
+            <a:off x="8128857" y="0"/>
+            <a:ext cx="4063143" cy="1576412"/>
+          </a:xfrm>
+          <a:prstGeom prst="rect">
+            <a:avLst/>
+          </a:prstGeom>
+          <a:gradFill>
+            <a:gsLst>
+              <a:gs pos="19000">
+                <a:schemeClr val="accent1">
+                  <a:lumMod val="50000"/>
+                  <a:alpha val="68000"/>
+                </a:schemeClr>
+              </a:gs>
+              <a:gs pos="100000">
+                <a:schemeClr val="accent1">
+                  <a:alpha val="79000"/>
+                </a:schemeClr>
+              </a:gs>
+            </a:gsLst>
+            <a:lin ang="19200000" scaled="0"/>
+          </a:gradFill>
+          <a:ln>
+            <a:noFill/>
+          </a:ln>
+        </p:spPr>
+        <p:style>
+          <a:lnRef idx="2">
+            <a:schemeClr val="accent1">
+              <a:shade val="50000"/>
+            </a:schemeClr>
+          </a:lnRef>
+          <a:fillRef idx="1">
+            <a:schemeClr val="accent1"/>
+          </a:fillRef>
+          <a:effectRef idx="0">
+            <a:schemeClr val="accent1"/>
+          </a:effectRef>
+          <a:fontRef idx="minor">
+            <a:schemeClr val="lt1"/>
+          </a:fontRef>
+        </p:style>
+        <p:txBody>
+          <a:bodyPr rtlCol="0" anchor="ctr"/>
+          <a:lstStyle/>
+          <a:p>
+            <a:pPr algn="ctr"/>
+            <a:endParaRPr lang="en-US"/>
+          </a:p>
+        </p:txBody>
+      </p:sp>
+      <p:sp>
+        <p:nvSpPr>
+          <p:cNvPr id="15" name="Rectangle 14">
+            <a:extLst>
+              <a:ext uri="{FF2B5EF4-FFF2-40B4-BE49-F238E27FC236}">
+                <a16:creationId xmlns:a16="http://schemas.microsoft.com/office/drawing/2014/main" id="{063BBA22-50EA-4C4D-BE05-F1CE4E63AA56}"/>
+              </a:ext>
+              <a:ext uri="{C183D7F6-B498-43B3-948B-1728B52AA6E4}">
+                <adec:decorative xmlns:adec="http://schemas.microsoft.com/office/drawing/2017/decorative" val="1"/>
+              </a:ext>
+            </a:extLst>
+          </p:cNvPr>
+          <p:cNvSpPr>
+            <a:spLocks noGrp="1" noRot="1" noChangeAspect="1" noMove="1" noResize="1" noEditPoints="1" noAdjustHandles="1" noChangeArrowheads="1" noChangeShapeType="1" noTextEdit="1"/>
+          </p:cNvSpPr>
+          <p:nvPr>
+            <p:extLst>
+              <p:ext uri="{386F3935-93C4-4BCD-93E2-E3B085C9AB24}">
+                <p16:designElem xmlns:p16="http://schemas.microsoft.com/office/powerpoint/2015/main" val="1"/>
+              </p:ext>
+            </p:extLst>
+          </p:nvPr>
+        </p:nvSpPr>
+        <p:spPr>
+          <a:xfrm rot="5400000">
+            <a:off x="5307777" y="-5307778"/>
+            <a:ext cx="1576446" cy="12192002"/>
+          </a:xfrm>
+          <a:prstGeom prst="rect">
+            <a:avLst/>
+          </a:prstGeom>
+          <a:gradFill>
+            <a:gsLst>
+              <a:gs pos="23000">
+                <a:schemeClr val="accent1">
+                  <a:alpha val="0"/>
+                </a:schemeClr>
+              </a:gs>
+              <a:gs pos="99000">
+                <a:srgbClr val="000000">
+                  <a:alpha val="74000"/>
+                </a:srgbClr>
+              </a:gs>
+            </a:gsLst>
+            <a:lin ang="20400000" scaled="0"/>
+          </a:gradFill>
+          <a:ln>
+            <a:noFill/>
+          </a:ln>
+        </p:spPr>
+        <p:style>
+          <a:lnRef idx="2">
+            <a:schemeClr val="accent1">
+              <a:shade val="50000"/>
+            </a:schemeClr>
+          </a:lnRef>
+          <a:fillRef idx="1">
+            <a:schemeClr val="accent1"/>
+          </a:fillRef>
+          <a:effectRef idx="0">
+            <a:schemeClr val="accent1"/>
+          </a:effectRef>
+          <a:fontRef idx="minor">
+            <a:schemeClr val="lt1"/>
+          </a:fontRef>
+        </p:style>
+        <p:txBody>
+          <a:bodyPr rtlCol="0" anchor="ctr"/>
+          <a:lstStyle/>
+          <a:p>
+            <a:pPr algn="ctr"/>
+            <a:endParaRPr lang="en-US" dirty="0"/>
+          </a:p>
+        </p:txBody>
+      </p:sp>
+      <p:sp>
+        <p:nvSpPr>
+          <p:cNvPr id="2" name="Title 1">
+            <a:extLst>
+              <a:ext uri="{FF2B5EF4-FFF2-40B4-BE49-F238E27FC236}">
+                <a16:creationId xmlns:a16="http://schemas.microsoft.com/office/drawing/2014/main" id="{9925ABEB-B8C6-4CC7-8A23-A10364A90D08}"/>
+              </a:ext>
+            </a:extLst>
+          </p:cNvPr>
+          <p:cNvSpPr>
+            <a:spLocks noGrp="1"/>
+          </p:cNvSpPr>
+          <p:nvPr>
+            <p:ph type="title"/>
+          </p:nvPr>
+        </p:nvSpPr>
+        <p:spPr>
+          <a:xfrm>
+            <a:off x="1371597" y="348865"/>
+            <a:ext cx="10044023" cy="877729"/>
+          </a:xfrm>
+        </p:spPr>
+        <p:txBody>
+          <a:bodyPr anchor="ctr">
+            <a:normAutofit/>
+          </a:bodyPr>
+          <a:lstStyle/>
+          <a:p>
+            <a:pPr marL="0" marR="0">
+              <a:spcBef>
+                <a:spcPts val="0"/>
+              </a:spcBef>
+              <a:spcAft>
+                <a:spcPts val="800"/>
+              </a:spcAft>
+            </a:pPr>
+            <a:r>
+              <a:rPr lang="ar-KW" sz="4000" dirty="0">
+                <a:solidFill>
+                  <a:srgbClr val="FFFFFF"/>
+                </a:solidFill>
+                <a:effectLst/>
+                <a:latin typeface="Calibri" panose="020F0502020204030204" pitchFamily="34" charset="0"/>
+                <a:ea typeface="Calibri" panose="020F0502020204030204" pitchFamily="34" charset="0"/>
+                <a:cs typeface="Arial" panose="020B0604020202020204" pitchFamily="34" charset="0"/>
+              </a:rPr>
+              <a:t>المشاكل الحالية</a:t>
+            </a:r>
+            <a:endParaRPr lang="en-US" sz="4000" dirty="0">
+              <a:solidFill>
+                <a:srgbClr val="FFFFFF"/>
+              </a:solidFill>
+              <a:effectLst/>
+              <a:latin typeface="Calibri" panose="020F0502020204030204" pitchFamily="34" charset="0"/>
+              <a:ea typeface="Calibri" panose="020F0502020204030204" pitchFamily="34" charset="0"/>
+              <a:cs typeface="Arial" panose="020B0604020202020204" pitchFamily="34" charset="0"/>
+            </a:endParaRPr>
+          </a:p>
+        </p:txBody>
+      </p:sp>
+      <p:graphicFrame>
+        <p:nvGraphicFramePr>
+          <p:cNvPr id="5" name="Content Placeholder 2">
+            <a:extLst>
+              <a:ext uri="{FF2B5EF4-FFF2-40B4-BE49-F238E27FC236}">
+                <a16:creationId xmlns:a16="http://schemas.microsoft.com/office/drawing/2014/main" id="{5E8B2A4C-4543-25F7-2F5D-67AD4499392C}"/>
+              </a:ext>
+            </a:extLst>
+          </p:cNvPr>
+          <p:cNvGraphicFramePr>
+            <a:graphicFrameLocks noGrp="1"/>
+          </p:cNvGraphicFramePr>
+          <p:nvPr>
+            <p:ph idx="1"/>
+            <p:extLst>
+              <p:ext uri="{D42A27DB-BD31-4B8C-83A1-F6EECF244321}">
+                <p14:modId xmlns:p14="http://schemas.microsoft.com/office/powerpoint/2010/main" val="4047471720"/>
+              </p:ext>
+            </p:extLst>
+          </p:nvPr>
+        </p:nvGraphicFramePr>
+        <p:xfrm>
+          <a:off x="644056" y="2112579"/>
+          <a:ext cx="10927829" cy="4192805"/>
+        </p:xfrm>
+        <a:graphic>
+          <a:graphicData uri="http://schemas.openxmlformats.org/drawingml/2006/diagram">
+            <dgm:relIds xmlns:dgm="http://schemas.openxmlformats.org/drawingml/2006/diagram" xmlns:r="http://schemas.openxmlformats.org/officeDocument/2006/relationships" r:dm="rId2" r:lo="rId3" r:qs="rId4" r:cs="rId5"/>
+          </a:graphicData>
+        </a:graphic>
+      </p:graphicFrame>
+    </p:spTree>
+    <p:extLst>
+      <p:ext uri="{BB962C8B-B14F-4D97-AF65-F5344CB8AC3E}">
+        <p14:creationId xmlns:p14="http://schemas.microsoft.com/office/powerpoint/2010/main" val="1069822785"/>
       </p:ext>
     </p:extLst>
   </p:cSld>

</xml_diff>